<commit_message>
added speaker notes and other minor changes
</commit_message>
<xml_diff>
--- a/SQLReporting.pptx
+++ b/SQLReporting.pptx
@@ -181,6 +181,99 @@
           </p14:sldIdLst>
         </p14:section>
       </p14:sectionLst>
+    </p:ext>
+    <p:ext uri="{EFAFB233-063F-42B5-8137-9DF3F51BA10A}">
+      <p15:sldGuideLst xmlns:p15="http://schemas.microsoft.com/office/powerpoint/2012/main">
+        <p15:guide id="1" orient="horz" pos="144">
+          <p15:clr>
+            <a:srgbClr val="A4A3A4"/>
+          </p15:clr>
+        </p15:guide>
+        <p15:guide id="2" orient="horz" pos="1200">
+          <p15:clr>
+            <a:srgbClr val="A4A3A4"/>
+          </p15:clr>
+        </p15:guide>
+        <p15:guide id="3" orient="horz" pos="2736">
+          <p15:clr>
+            <a:srgbClr val="A4A3A4"/>
+          </p15:clr>
+        </p15:guide>
+        <p15:guide id="4" orient="horz" pos="4176">
+          <p15:clr>
+            <a:srgbClr val="A4A3A4"/>
+          </p15:clr>
+        </p15:guide>
+        <p15:guide id="5" orient="horz" pos="1488">
+          <p15:clr>
+            <a:srgbClr val="A4A3A4"/>
+          </p15:clr>
+        </p15:guide>
+        <p15:guide id="6" orient="horz" pos="912">
+          <p15:clr>
+            <a:srgbClr val="A4A3A4"/>
+          </p15:clr>
+        </p15:guide>
+        <p15:guide id="7" pos="3839">
+          <p15:clr>
+            <a:srgbClr val="A4A3A4"/>
+          </p15:clr>
+        </p15:guide>
+        <p15:guide id="8" pos="327">
+          <p15:clr>
+            <a:srgbClr val="A4A3A4"/>
+          </p15:clr>
+        </p15:guide>
+        <p15:guide id="9" pos="1190">
+          <p15:clr>
+            <a:srgbClr val="A4A3A4"/>
+          </p15:clr>
+        </p15:guide>
+        <p15:guide id="10" pos="7350">
+          <p15:clr>
+            <a:srgbClr val="A4A3A4"/>
+          </p15:clr>
+        </p15:guide>
+        <p15:guide id="11" pos="7063">
+          <p15:clr>
+            <a:srgbClr val="A4A3A4"/>
+          </p15:clr>
+        </p15:guide>
+        <p15:guide id="12" pos="611">
+          <p15:clr>
+            <a:srgbClr val="A4A3A4"/>
+          </p15:clr>
+        </p15:guide>
+        <p15:guide id="13" pos="1994">
+          <p15:clr>
+            <a:srgbClr val="A4A3A4"/>
+          </p15:clr>
+        </p15:guide>
+        <p15:guide id="14" pos="3098">
+          <p15:clr>
+            <a:srgbClr val="A4A3A4"/>
+          </p15:clr>
+        </p15:guide>
+        <p15:guide id="15" pos="3314">
+          <p15:clr>
+            <a:srgbClr val="A4A3A4"/>
+          </p15:clr>
+        </p15:guide>
+      </p15:sldGuideLst>
+    </p:ext>
+    <p:ext uri="{2D200454-40CA-4A62-9FC3-DE9A4176ACB9}">
+      <p15:notesGuideLst xmlns:p15="http://schemas.microsoft.com/office/powerpoint/2012/main">
+        <p15:guide id="1" orient="horz" pos="2880">
+          <p15:clr>
+            <a:srgbClr val="A4A3A4"/>
+          </p15:clr>
+        </p15:guide>
+        <p15:guide id="2" pos="2160">
+          <p15:clr>
+            <a:srgbClr val="A4A3A4"/>
+          </p15:clr>
+        </p15:guide>
+      </p15:notesGuideLst>
     </p:ext>
   </p:extLst>
 </p:presentation>
@@ -2321,7 +2414,7 @@
                 <a:latin typeface="Segoe UI" pitchFamily="34" charset="0"/>
               </a:rPr>
               <a:pPr/>
-              <a:t>7/30/2012</a:t>
+              <a:t>9/18/2012</a:t>
             </a:fld>
             <a:endParaRPr lang="en-US" dirty="0">
               <a:latin typeface="Segoe UI" pitchFamily="34" charset="0"/>
@@ -2534,7 +2627,7 @@
             <a:fld id="{7C3FBCD4-166E-446F-AF18-7D4A0CF9AEF6}" type="datetimeFigureOut">
               <a:rPr lang="en-US" smtClean="0"/>
               <a:pPr/>
-              <a:t>7/30/2012</a:t>
+              <a:t>9/18/2012</a:t>
             </a:fld>
             <a:endParaRPr lang="en-US" dirty="0"/>
           </a:p>
@@ -2927,6 +3020,153 @@
           <a:bodyPr/>
           <a:lstStyle/>
           <a:p>
+            <a:pPr rtl="0"/>
+            <a:r>
+              <a:rPr lang="en-US" b="1" dirty="0" smtClean="0">
+                <a:effectLst/>
+                <a:latin typeface="Segoe UI" panose="020B0502040204020203" pitchFamily="34" charset="0"/>
+              </a:rPr>
+              <a:t>Slide Objectives:</a:t>
+            </a:r>
+            <a:endParaRPr lang="en-US" dirty="0" smtClean="0">
+              <a:effectLst/>
+            </a:endParaRPr>
+          </a:p>
+          <a:p>
+            <a:pPr rtl="0"/>
+            <a:r>
+              <a:rPr lang="en-US" dirty="0" smtClean="0">
+                <a:effectLst/>
+                <a:latin typeface="Segoe UI" panose="020B0502040204020203" pitchFamily="34" charset="0"/>
+              </a:rPr>
+              <a:t>Discuss the Agenda</a:t>
+            </a:r>
+            <a:endParaRPr lang="en-US" dirty="0" smtClean="0">
+              <a:effectLst/>
+            </a:endParaRPr>
+          </a:p>
+          <a:p>
+            <a:pPr rtl="0"/>
+            <a:r>
+              <a:rPr lang="en-US" b="1" dirty="0" smtClean="0">
+                <a:effectLst/>
+                <a:latin typeface="Segoe UI" panose="020B0502040204020203" pitchFamily="34" charset="0"/>
+              </a:rPr>
+              <a:t>Transition:</a:t>
+            </a:r>
+            <a:endParaRPr lang="en-US" dirty="0" smtClean="0">
+              <a:effectLst/>
+            </a:endParaRPr>
+          </a:p>
+          <a:p>
+            <a:pPr rtl="0"/>
+            <a:r>
+              <a:rPr lang="en-US" dirty="0" smtClean="0">
+                <a:effectLst/>
+                <a:latin typeface="Segoe UI" panose="020B0502040204020203" pitchFamily="34" charset="0"/>
+              </a:rPr>
+              <a:t>The</a:t>
+            </a:r>
+            <a:r>
+              <a:rPr lang="en-US" baseline="0" dirty="0" smtClean="0">
+                <a:effectLst/>
+                <a:latin typeface="Segoe UI" panose="020B0502040204020203" pitchFamily="34" charset="0"/>
+              </a:rPr>
+              <a:t> topics discuss will cover the following topics with demos spread throughout.</a:t>
+            </a:r>
+            <a:endParaRPr lang="en-US" dirty="0" smtClean="0">
+              <a:effectLst/>
+            </a:endParaRPr>
+          </a:p>
+          <a:p>
+            <a:pPr rtl="0"/>
+            <a:r>
+              <a:rPr lang="en-US" b="1" dirty="0" smtClean="0">
+                <a:effectLst/>
+                <a:latin typeface="Segoe UI" panose="020B0502040204020203" pitchFamily="34" charset="0"/>
+              </a:rPr>
+              <a:t>Speaking Points:</a:t>
+            </a:r>
+            <a:endParaRPr lang="en-US" dirty="0" smtClean="0">
+              <a:effectLst/>
+            </a:endParaRPr>
+          </a:p>
+          <a:p>
+            <a:pPr rtl="0"/>
+            <a:r>
+              <a:rPr lang="en-US" dirty="0" smtClean="0">
+                <a:effectLst/>
+                <a:latin typeface="Segoe UI" panose="020B0502040204020203" pitchFamily="34" charset="0"/>
+              </a:rPr>
+              <a:t>Overview</a:t>
+            </a:r>
+            <a:endParaRPr lang="en-US" dirty="0" smtClean="0">
+              <a:effectLst/>
+            </a:endParaRPr>
+          </a:p>
+          <a:p>
+            <a:pPr rtl="0"/>
+            <a:r>
+              <a:rPr lang="en-US" dirty="0" smtClean="0">
+                <a:effectLst/>
+                <a:latin typeface="Segoe UI" panose="020B0502040204020203" pitchFamily="34" charset="0"/>
+              </a:rPr>
+              <a:t>Architecture</a:t>
+            </a:r>
+          </a:p>
+          <a:p>
+            <a:pPr rtl="0"/>
+            <a:r>
+              <a:rPr lang="en-US" dirty="0" smtClean="0">
+                <a:effectLst/>
+                <a:latin typeface="Segoe UI" panose="020B0502040204020203" pitchFamily="34" charset="0"/>
+              </a:rPr>
+              <a:t>Features</a:t>
+            </a:r>
+          </a:p>
+          <a:p>
+            <a:pPr rtl="0"/>
+            <a:r>
+              <a:rPr lang="en-US" dirty="0" smtClean="0">
+                <a:effectLst/>
+                <a:latin typeface="Segoe UI" panose="020B0502040204020203" pitchFamily="34" charset="0"/>
+              </a:rPr>
+              <a:t>Walkthrough</a:t>
+            </a:r>
+            <a:endParaRPr lang="en-US" dirty="0" smtClean="0">
+              <a:effectLst/>
+            </a:endParaRPr>
+          </a:p>
+          <a:p>
+            <a:pPr rtl="0"/>
+            <a:r>
+              <a:rPr lang="en-US" b="1" dirty="0" smtClean="0">
+                <a:effectLst/>
+                <a:latin typeface="Segoe UI" panose="020B0502040204020203" pitchFamily="34" charset="0"/>
+              </a:rPr>
+              <a:t>Notes:</a:t>
+            </a:r>
+            <a:endParaRPr lang="en-US" dirty="0" smtClean="0">
+              <a:effectLst/>
+            </a:endParaRPr>
+          </a:p>
+          <a:p>
+            <a:pPr rtl="0"/>
+            <a:r>
+              <a:rPr lang="en-US" dirty="0" smtClean="0">
+                <a:effectLst/>
+                <a:latin typeface="Segoe UI" panose="020B0502040204020203" pitchFamily="34" charset="0"/>
+              </a:rPr>
+              <a:t>Any notes go here</a:t>
+            </a:r>
+            <a:endParaRPr lang="en-US" dirty="0" smtClean="0">
+              <a:effectLst/>
+            </a:endParaRPr>
+          </a:p>
+          <a:p>
+            <a:endParaRPr lang="en-US" dirty="0" smtClean="0"/>
+          </a:p>
+          <a:p>
             <a:endParaRPr lang="en-US" dirty="0"/>
           </a:p>
         </p:txBody>
@@ -3012,6 +3252,183 @@
           <a:bodyPr/>
           <a:lstStyle/>
           <a:p>
+            <a:pPr rtl="0"/>
+            <a:r>
+              <a:rPr lang="en-US" b="1" dirty="0" smtClean="0">
+                <a:effectLst/>
+                <a:latin typeface="Segoe UI" panose="020B0502040204020203" pitchFamily="34" charset="0"/>
+              </a:rPr>
+              <a:t>Slide Objectives:</a:t>
+            </a:r>
+            <a:endParaRPr lang="en-US" dirty="0" smtClean="0">
+              <a:effectLst/>
+            </a:endParaRPr>
+          </a:p>
+          <a:p>
+            <a:pPr rtl="0"/>
+            <a:r>
+              <a:rPr lang="en-US" dirty="0" smtClean="0">
+                <a:effectLst/>
+                <a:latin typeface="Segoe UI" panose="020B0502040204020203" pitchFamily="34" charset="0"/>
+              </a:rPr>
+              <a:t>Outline different methods</a:t>
+            </a:r>
+            <a:r>
+              <a:rPr lang="en-US" baseline="0" dirty="0" smtClean="0">
+                <a:effectLst/>
+                <a:latin typeface="Segoe UI" panose="020B0502040204020203" pitchFamily="34" charset="0"/>
+              </a:rPr>
+              <a:t> for accessing a SQL Reporting report</a:t>
+            </a:r>
+            <a:endParaRPr lang="en-US" dirty="0" smtClean="0">
+              <a:effectLst/>
+            </a:endParaRPr>
+          </a:p>
+          <a:p>
+            <a:pPr rtl="0"/>
+            <a:r>
+              <a:rPr lang="en-US" b="1" dirty="0" smtClean="0">
+                <a:effectLst/>
+                <a:latin typeface="Segoe UI" panose="020B0502040204020203" pitchFamily="34" charset="0"/>
+              </a:rPr>
+              <a:t>Transition:</a:t>
+            </a:r>
+            <a:endParaRPr lang="en-US" dirty="0" smtClean="0">
+              <a:effectLst/>
+            </a:endParaRPr>
+          </a:p>
+          <a:p>
+            <a:pPr rtl="0"/>
+            <a:r>
+              <a:rPr lang="en-US" dirty="0" smtClean="0">
+                <a:effectLst/>
+                <a:latin typeface="Segoe UI" panose="020B0502040204020203" pitchFamily="34" charset="0"/>
+              </a:rPr>
+              <a:t>Three are</a:t>
+            </a:r>
+            <a:r>
+              <a:rPr lang="en-US" baseline="0" dirty="0" smtClean="0">
+                <a:effectLst/>
+                <a:latin typeface="Segoe UI" panose="020B0502040204020203" pitchFamily="34" charset="0"/>
+              </a:rPr>
+              <a:t> multiple ways to view SQL Reporting reports that provide the flexibility a reporting solution should have.</a:t>
+            </a:r>
+            <a:endParaRPr lang="en-US" dirty="0" smtClean="0">
+              <a:effectLst/>
+            </a:endParaRPr>
+          </a:p>
+          <a:p>
+            <a:pPr rtl="0"/>
+            <a:r>
+              <a:rPr lang="en-US" b="1" dirty="0" smtClean="0">
+                <a:effectLst/>
+                <a:latin typeface="Segoe UI" panose="020B0502040204020203" pitchFamily="34" charset="0"/>
+              </a:rPr>
+              <a:t>Speaking Points:</a:t>
+            </a:r>
+            <a:endParaRPr lang="en-US" dirty="0" smtClean="0">
+              <a:effectLst/>
+            </a:endParaRPr>
+          </a:p>
+          <a:p>
+            <a:pPr rtl="0"/>
+            <a:r>
+              <a:rPr lang="en-US" dirty="0" smtClean="0">
+                <a:effectLst/>
+                <a:latin typeface="Segoe UI" panose="020B0502040204020203" pitchFamily="34" charset="0"/>
+              </a:rPr>
+              <a:t>A link to the report can be embedded as</a:t>
+            </a:r>
+            <a:r>
+              <a:rPr lang="en-US" baseline="0" dirty="0" smtClean="0">
+                <a:effectLst/>
+                <a:latin typeface="Segoe UI" panose="020B0502040204020203" pitchFamily="34" charset="0"/>
+              </a:rPr>
+              <a:t> a URL in an email</a:t>
+            </a:r>
+            <a:endParaRPr lang="en-US" dirty="0" smtClean="0">
+              <a:effectLst/>
+            </a:endParaRPr>
+          </a:p>
+          <a:p>
+            <a:pPr rtl="0"/>
+            <a:r>
+              <a:rPr lang="en-US" dirty="0" smtClean="0">
+                <a:effectLst/>
+                <a:latin typeface="Segoe UI" panose="020B0502040204020203" pitchFamily="34" charset="0"/>
+              </a:rPr>
+              <a:t>View reports</a:t>
+            </a:r>
+            <a:r>
+              <a:rPr lang="en-US" baseline="0" dirty="0" smtClean="0">
+                <a:effectLst/>
+                <a:latin typeface="Segoe UI" panose="020B0502040204020203" pitchFamily="34" charset="0"/>
+              </a:rPr>
+              <a:t> via the application embedded </a:t>
+            </a:r>
+            <a:r>
+              <a:rPr lang="en-US" baseline="0" dirty="0" err="1" smtClean="0">
+                <a:effectLst/>
+                <a:latin typeface="Segoe UI" panose="020B0502040204020203" pitchFamily="34" charset="0"/>
+              </a:rPr>
+              <a:t>ReportViewer</a:t>
+            </a:r>
+            <a:r>
+              <a:rPr lang="en-US" baseline="0" dirty="0" smtClean="0">
+                <a:effectLst/>
+                <a:latin typeface="Segoe UI" panose="020B0502040204020203" pitchFamily="34" charset="0"/>
+              </a:rPr>
+              <a:t> control that point to the hosted report</a:t>
+            </a:r>
+          </a:p>
+          <a:p>
+            <a:pPr rtl="0"/>
+            <a:r>
+              <a:rPr lang="en-US" dirty="0" smtClean="0">
+                <a:effectLst/>
+              </a:rPr>
+              <a:t>Through</a:t>
+            </a:r>
+            <a:r>
+              <a:rPr lang="en-US" baseline="0" dirty="0" smtClean="0">
+                <a:effectLst/>
+              </a:rPr>
+              <a:t> SharePoint / SharePoint Online</a:t>
+            </a:r>
+            <a:endParaRPr lang="en-US" dirty="0" smtClean="0">
+              <a:effectLst/>
+            </a:endParaRPr>
+          </a:p>
+          <a:p>
+            <a:pPr rtl="0"/>
+            <a:r>
+              <a:rPr lang="en-US" b="1" dirty="0" smtClean="0">
+                <a:effectLst/>
+                <a:latin typeface="Segoe UI" panose="020B0502040204020203" pitchFamily="34" charset="0"/>
+              </a:rPr>
+              <a:t>Notes:</a:t>
+            </a:r>
+            <a:endParaRPr lang="en-US" dirty="0" smtClean="0">
+              <a:effectLst/>
+            </a:endParaRPr>
+          </a:p>
+          <a:p>
+            <a:pPr rtl="0"/>
+            <a:r>
+              <a:rPr lang="en-US" dirty="0" smtClean="0">
+                <a:effectLst/>
+                <a:latin typeface="Segoe UI" panose="020B0502040204020203" pitchFamily="34" charset="0"/>
+              </a:rPr>
+              <a:t>Any notes go here</a:t>
+            </a:r>
+            <a:endParaRPr lang="en-US" dirty="0" smtClean="0">
+              <a:effectLst/>
+            </a:endParaRPr>
+          </a:p>
+          <a:p>
+            <a:endParaRPr lang="en-US" dirty="0" smtClean="0"/>
+          </a:p>
+          <a:p>
             <a:endParaRPr lang="en-US" dirty="0"/>
           </a:p>
         </p:txBody>
@@ -3097,6 +3514,157 @@
           <a:bodyPr/>
           <a:lstStyle/>
           <a:p>
+            <a:pPr rtl="0"/>
+            <a:r>
+              <a:rPr lang="en-US" b="1" dirty="0" smtClean="0">
+                <a:effectLst/>
+                <a:latin typeface="Segoe UI" panose="020B0502040204020203" pitchFamily="34" charset="0"/>
+              </a:rPr>
+              <a:t>Slide Objectives:</a:t>
+            </a:r>
+            <a:endParaRPr lang="en-US" dirty="0" smtClean="0">
+              <a:effectLst/>
+            </a:endParaRPr>
+          </a:p>
+          <a:p>
+            <a:pPr rtl="0"/>
+            <a:r>
+              <a:rPr lang="en-US" dirty="0" smtClean="0">
+                <a:effectLst/>
+                <a:latin typeface="Segoe UI" panose="020B0502040204020203" pitchFamily="34" charset="0"/>
+              </a:rPr>
+              <a:t>Describe</a:t>
+            </a:r>
+            <a:r>
+              <a:rPr lang="en-US" baseline="0" dirty="0" smtClean="0">
+                <a:effectLst/>
+                <a:latin typeface="Segoe UI" panose="020B0502040204020203" pitchFamily="34" charset="0"/>
+              </a:rPr>
+              <a:t> the different types of report availability for SQL Reporting. </a:t>
+            </a:r>
+            <a:endParaRPr lang="en-US" dirty="0" smtClean="0">
+              <a:effectLst/>
+            </a:endParaRPr>
+          </a:p>
+          <a:p>
+            <a:pPr rtl="0"/>
+            <a:r>
+              <a:rPr lang="en-US" b="1" dirty="0" smtClean="0">
+                <a:effectLst/>
+                <a:latin typeface="Segoe UI" panose="020B0502040204020203" pitchFamily="34" charset="0"/>
+              </a:rPr>
+              <a:t>Transition:</a:t>
+            </a:r>
+            <a:endParaRPr lang="en-US" dirty="0" smtClean="0">
+              <a:effectLst/>
+            </a:endParaRPr>
+          </a:p>
+          <a:p>
+            <a:pPr rtl="0"/>
+            <a:r>
+              <a:rPr lang="en-US" dirty="0" smtClean="0">
+                <a:effectLst/>
+                <a:latin typeface="Segoe UI" panose="020B0502040204020203" pitchFamily="34" charset="0"/>
+              </a:rPr>
+              <a:t>One of the great foundational</a:t>
+            </a:r>
+            <a:r>
+              <a:rPr lang="en-US" baseline="0" dirty="0" smtClean="0">
+                <a:effectLst/>
+                <a:latin typeface="Segoe UI" panose="020B0502040204020203" pitchFamily="34" charset="0"/>
+              </a:rPr>
+              <a:t> principles of SQL Reporting is that it encompasses the same security model for SQL Server Reporting Services, and as such, makes report creation and execution by users extremely flexible. </a:t>
+            </a:r>
+            <a:endParaRPr lang="en-US" dirty="0" smtClean="0">
+              <a:effectLst/>
+            </a:endParaRPr>
+          </a:p>
+          <a:p>
+            <a:pPr rtl="0"/>
+            <a:r>
+              <a:rPr lang="en-US" b="1" dirty="0" smtClean="0">
+                <a:effectLst/>
+                <a:latin typeface="Segoe UI" panose="020B0502040204020203" pitchFamily="34" charset="0"/>
+              </a:rPr>
+              <a:t>Speaking Points:</a:t>
+            </a:r>
+            <a:endParaRPr lang="en-US" dirty="0" smtClean="0">
+              <a:effectLst/>
+            </a:endParaRPr>
+          </a:p>
+          <a:p>
+            <a:pPr rtl="0"/>
+            <a:r>
+              <a:rPr lang="en-US" dirty="0" smtClean="0">
+                <a:effectLst/>
+                <a:latin typeface="Segoe UI" panose="020B0502040204020203" pitchFamily="34" charset="0"/>
+              </a:rPr>
+              <a:t>Anyone with a Windows Azure subscription can create and</a:t>
+            </a:r>
+            <a:r>
+              <a:rPr lang="en-US" baseline="0" dirty="0" smtClean="0">
+                <a:effectLst/>
+                <a:latin typeface="Segoe UI" panose="020B0502040204020203" pitchFamily="34" charset="0"/>
+              </a:rPr>
+              <a:t> manage reporting servers</a:t>
+            </a:r>
+            <a:endParaRPr lang="en-US" dirty="0" smtClean="0">
+              <a:effectLst/>
+            </a:endParaRPr>
+          </a:p>
+          <a:p>
+            <a:pPr rtl="0"/>
+            <a:r>
+              <a:rPr lang="en-US" dirty="0" smtClean="0">
+                <a:effectLst/>
+                <a:latin typeface="Segoe UI" panose="020B0502040204020203" pitchFamily="34" charset="0"/>
+              </a:rPr>
+              <a:t>Any authorized user can view</a:t>
+            </a:r>
+            <a:r>
+              <a:rPr lang="en-US" baseline="0" dirty="0" smtClean="0">
+                <a:effectLst/>
+                <a:latin typeface="Segoe UI" panose="020B0502040204020203" pitchFamily="34" charset="0"/>
+              </a:rPr>
+              <a:t> a report</a:t>
+            </a:r>
+          </a:p>
+          <a:p>
+            <a:pPr rtl="0"/>
+            <a:endParaRPr lang="en-US" dirty="0" smtClean="0">
+              <a:effectLst/>
+            </a:endParaRPr>
+          </a:p>
+          <a:p>
+            <a:pPr rtl="0"/>
+            <a:r>
+              <a:rPr lang="en-US" b="1" dirty="0" smtClean="0">
+                <a:effectLst/>
+                <a:latin typeface="Segoe UI" panose="020B0502040204020203" pitchFamily="34" charset="0"/>
+              </a:rPr>
+              <a:t>Notes:</a:t>
+            </a:r>
+            <a:endParaRPr lang="en-US" dirty="0" smtClean="0">
+              <a:effectLst/>
+            </a:endParaRPr>
+          </a:p>
+          <a:p>
+            <a:pPr rtl="0"/>
+            <a:r>
+              <a:rPr lang="en-US" dirty="0" smtClean="0">
+                <a:effectLst/>
+                <a:latin typeface="Segoe UI" panose="020B0502040204020203" pitchFamily="34" charset="0"/>
+              </a:rPr>
+              <a:t>Trial is available at WindowsAzure.com</a:t>
+            </a:r>
+            <a:endParaRPr lang="en-US" dirty="0" smtClean="0">
+              <a:effectLst/>
+            </a:endParaRPr>
+          </a:p>
+          <a:p>
+            <a:endParaRPr lang="en-US" dirty="0" smtClean="0"/>
+          </a:p>
+          <a:p>
             <a:endParaRPr lang="en-US" dirty="0"/>
           </a:p>
         </p:txBody>
@@ -3206,8 +3774,9 @@
             </a:pPr>
             <a:r>
               <a:rPr lang="en-US" baseline="0" dirty="0" smtClean="0"/>
-              <a:t>Tools Exploration (SSDT)</a:t>
-            </a:r>
+              <a:t>User Management</a:t>
+            </a:r>
+            <a:endParaRPr lang="en-US" baseline="0" dirty="0" smtClean="0"/>
           </a:p>
         </p:txBody>
       </p:sp>
@@ -3291,19 +3860,213 @@
           <a:bodyPr/>
           <a:lstStyle/>
           <a:p>
-            <a:pPr marL="0" indent="0">
-              <a:buNone/>
-            </a:pPr>
-            <a:endParaRPr lang="en-US" sz="900" spc="-50" dirty="0" smtClean="0">
-              <a:latin typeface="Segoe UI Light" pitchFamily="34" charset="0"/>
+            <a:pPr rtl="0"/>
+            <a:r>
+              <a:rPr lang="en-US" sz="800" b="1" dirty="0" smtClean="0">
+                <a:effectLst/>
+                <a:latin typeface="Segoe UI" panose="020B0502040204020203" pitchFamily="34" charset="0"/>
+              </a:rPr>
+              <a:t>Slide </a:t>
+            </a:r>
+            <a:r>
+              <a:rPr lang="en-US" sz="800" b="1" dirty="0" smtClean="0">
+                <a:effectLst/>
+                <a:latin typeface="Segoe UI" panose="020B0502040204020203" pitchFamily="34" charset="0"/>
+              </a:rPr>
+              <a:t>Objectives:</a:t>
+            </a:r>
+            <a:endParaRPr lang="en-US" sz="800" dirty="0" smtClean="0">
+              <a:effectLst/>
             </a:endParaRPr>
           </a:p>
           <a:p>
-            <a:pPr marL="0" indent="0">
-              <a:buNone/>
-            </a:pPr>
-            <a:endParaRPr lang="en-US" sz="900" spc="-50" dirty="0" smtClean="0">
-              <a:latin typeface="Segoe UI Light" pitchFamily="34" charset="0"/>
+            <a:pPr rtl="0"/>
+            <a:r>
+              <a:rPr lang="en-US" sz="800" dirty="0" smtClean="0">
+                <a:effectLst/>
+                <a:latin typeface="Segoe UI" panose="020B0502040204020203" pitchFamily="34" charset="0"/>
+              </a:rPr>
+              <a:t>Quick end-to-end</a:t>
+            </a:r>
+            <a:r>
+              <a:rPr lang="en-US" sz="800" baseline="0" dirty="0" smtClean="0">
+                <a:effectLst/>
+                <a:latin typeface="Segoe UI" panose="020B0502040204020203" pitchFamily="34" charset="0"/>
+              </a:rPr>
+              <a:t> illustration showing how to begin using SQL Reporting</a:t>
+            </a:r>
+            <a:endParaRPr lang="en-US" sz="800" dirty="0" smtClean="0">
+              <a:effectLst/>
+            </a:endParaRPr>
+          </a:p>
+          <a:p>
+            <a:pPr rtl="0"/>
+            <a:r>
+              <a:rPr lang="en-US" sz="800" b="1" dirty="0" smtClean="0">
+                <a:effectLst/>
+                <a:latin typeface="Segoe UI" panose="020B0502040204020203" pitchFamily="34" charset="0"/>
+              </a:rPr>
+              <a:t>Transition:</a:t>
+            </a:r>
+            <a:endParaRPr lang="en-US" sz="800" dirty="0" smtClean="0">
+              <a:effectLst/>
+            </a:endParaRPr>
+          </a:p>
+          <a:p>
+            <a:pPr rtl="0"/>
+            <a:r>
+              <a:rPr lang="en-US" sz="800" dirty="0" smtClean="0">
+                <a:effectLst/>
+                <a:latin typeface="Segoe UI" panose="020B0502040204020203" pitchFamily="34" charset="0"/>
+              </a:rPr>
+              <a:t>Here is a quick sample</a:t>
+            </a:r>
+            <a:r>
+              <a:rPr lang="en-US" sz="800" baseline="0" dirty="0" smtClean="0">
+                <a:effectLst/>
+                <a:latin typeface="Segoe UI" panose="020B0502040204020203" pitchFamily="34" charset="0"/>
+              </a:rPr>
+              <a:t> overview </a:t>
+            </a:r>
+            <a:r>
+              <a:rPr lang="en-US" sz="800" dirty="0" smtClean="0">
+                <a:effectLst/>
+                <a:latin typeface="Segoe UI" panose="020B0502040204020203" pitchFamily="34" charset="0"/>
+              </a:rPr>
+              <a:t>of the end-to-end</a:t>
+            </a:r>
+            <a:r>
+              <a:rPr lang="en-US" sz="800" baseline="0" dirty="0" smtClean="0">
+                <a:effectLst/>
+                <a:latin typeface="Segoe UI" panose="020B0502040204020203" pitchFamily="34" charset="0"/>
+              </a:rPr>
+              <a:t> </a:t>
+            </a:r>
+            <a:r>
+              <a:rPr lang="en-US" sz="800" dirty="0" smtClean="0">
+                <a:effectLst/>
+                <a:latin typeface="Segoe UI" panose="020B0502040204020203" pitchFamily="34" charset="0"/>
+              </a:rPr>
+              <a:t>process from</a:t>
+            </a:r>
+            <a:r>
+              <a:rPr lang="en-US" sz="800" baseline="0" dirty="0" smtClean="0">
+                <a:effectLst/>
+                <a:latin typeface="Segoe UI" panose="020B0502040204020203" pitchFamily="34" charset="0"/>
+              </a:rPr>
+              <a:t> provisioning a SQL Reporting server to creating and deploying a report.</a:t>
+            </a:r>
+            <a:endParaRPr lang="en-US" sz="800" dirty="0" smtClean="0">
+              <a:effectLst/>
+            </a:endParaRPr>
+          </a:p>
+          <a:p>
+            <a:pPr rtl="0"/>
+            <a:r>
+              <a:rPr lang="en-US" sz="800" b="1" dirty="0" smtClean="0">
+                <a:effectLst/>
+                <a:latin typeface="Segoe UI" panose="020B0502040204020203" pitchFamily="34" charset="0"/>
+              </a:rPr>
+              <a:t>Speaking Points:</a:t>
+            </a:r>
+            <a:endParaRPr lang="en-US" sz="800" dirty="0" smtClean="0">
+              <a:effectLst/>
+            </a:endParaRPr>
+          </a:p>
+          <a:p>
+            <a:pPr rtl="0"/>
+            <a:r>
+              <a:rPr lang="en-US" sz="800" dirty="0" smtClean="0">
+                <a:effectLst/>
+                <a:latin typeface="Segoe UI" panose="020B0502040204020203" pitchFamily="34" charset="0"/>
+              </a:rPr>
+              <a:t>Log in to the current</a:t>
+            </a:r>
+            <a:r>
+              <a:rPr lang="en-US" sz="800" baseline="0" dirty="0" smtClean="0">
+                <a:effectLst/>
+                <a:latin typeface="Segoe UI" panose="020B0502040204020203" pitchFamily="34" charset="0"/>
+              </a:rPr>
+              <a:t> portal</a:t>
+            </a:r>
+          </a:p>
+          <a:p>
+            <a:pPr rtl="0"/>
+            <a:r>
+              <a:rPr lang="en-US" sz="800" baseline="0" dirty="0" smtClean="0">
+                <a:effectLst/>
+                <a:latin typeface="Segoe UI" panose="020B0502040204020203" pitchFamily="34" charset="0"/>
+              </a:rPr>
+              <a:t>Select the Reporting node</a:t>
+            </a:r>
+          </a:p>
+          <a:p>
+            <a:pPr rtl="0"/>
+            <a:r>
+              <a:rPr lang="en-US" sz="800" baseline="0" dirty="0" smtClean="0">
+                <a:effectLst/>
+                <a:latin typeface="Segoe UI" panose="020B0502040204020203" pitchFamily="34" charset="0"/>
+              </a:rPr>
+              <a:t>Create a new Reporting server</a:t>
+            </a:r>
+            <a:endParaRPr lang="en-US" sz="800" dirty="0" smtClean="0">
+              <a:effectLst/>
+            </a:endParaRPr>
+          </a:p>
+          <a:p>
+            <a:pPr rtl="0"/>
+            <a:r>
+              <a:rPr lang="en-US" sz="800" dirty="0" smtClean="0">
+                <a:effectLst/>
+                <a:latin typeface="Segoe UI" panose="020B0502040204020203" pitchFamily="34" charset="0"/>
+              </a:rPr>
+              <a:t>Open SQL Server Data Tools</a:t>
+            </a:r>
+          </a:p>
+          <a:p>
+            <a:pPr rtl="0"/>
+            <a:r>
+              <a:rPr lang="en-US" sz="800" dirty="0" smtClean="0">
+                <a:effectLst/>
+                <a:latin typeface="Segoe UI" panose="020B0502040204020203" pitchFamily="34" charset="0"/>
+              </a:rPr>
+              <a:t>Create a Report</a:t>
+            </a:r>
+          </a:p>
+          <a:p>
+            <a:pPr rtl="0"/>
+            <a:r>
+              <a:rPr lang="en-US" sz="800" dirty="0" smtClean="0">
+                <a:effectLst/>
+                <a:latin typeface="Segoe UI" panose="020B0502040204020203" pitchFamily="34" charset="0"/>
+              </a:rPr>
+              <a:t>Set the properties on the report</a:t>
+            </a:r>
+          </a:p>
+          <a:p>
+            <a:pPr rtl="0"/>
+            <a:r>
+              <a:rPr lang="en-US" sz="800" dirty="0" smtClean="0">
+                <a:effectLst/>
+                <a:latin typeface="Segoe UI" panose="020B0502040204020203" pitchFamily="34" charset="0"/>
+              </a:rPr>
+              <a:t>Deploy the report</a:t>
+            </a:r>
+            <a:endParaRPr lang="en-US" sz="800" dirty="0" smtClean="0">
+              <a:effectLst/>
+            </a:endParaRPr>
+          </a:p>
+          <a:p>
+            <a:pPr rtl="0"/>
+            <a:r>
+              <a:rPr lang="en-US" sz="800" b="1" dirty="0" smtClean="0">
+                <a:effectLst/>
+                <a:latin typeface="Segoe UI" panose="020B0502040204020203" pitchFamily="34" charset="0"/>
+              </a:rPr>
+              <a:t>Notes:</a:t>
+            </a:r>
+            <a:endParaRPr lang="en-US" sz="800" dirty="0" smtClean="0">
+              <a:effectLst/>
             </a:endParaRPr>
           </a:p>
           <a:p>
@@ -3375,6 +4138,15 @@
               </a:rPr>
               <a:t>.</a:t>
             </a:r>
+            <a:endParaRPr lang="en-US" sz="800" dirty="0" smtClean="0"/>
+          </a:p>
+          <a:p>
+            <a:pPr rtl="0"/>
+            <a:endParaRPr lang="en-US" sz="800" dirty="0" smtClean="0">
+              <a:effectLst/>
+            </a:endParaRPr>
+          </a:p>
+          <a:p>
             <a:endParaRPr lang="en-US" sz="800" dirty="0" smtClean="0"/>
           </a:p>
           <a:p>
@@ -3558,6 +4330,208 @@
 </p:notes>
 </file>
 
+<file path=ppt/notesSlides/notesSlide15.xml><?xml version="1.0" encoding="utf-8"?>
+<p:notes xmlns:a="http://schemas.openxmlformats.org/drawingml/2006/main" xmlns:r="http://schemas.openxmlformats.org/officeDocument/2006/relationships" xmlns:p="http://schemas.openxmlformats.org/presentationml/2006/main">
+  <p:cSld>
+    <p:spTree>
+      <p:nvGrpSpPr>
+        <p:cNvPr id="1" name=""/>
+        <p:cNvGrpSpPr/>
+        <p:nvPr/>
+      </p:nvGrpSpPr>
+      <p:grpSpPr>
+        <a:xfrm>
+          <a:off x="0" y="0"/>
+          <a:ext cx="0" cy="0"/>
+          <a:chOff x="0" y="0"/>
+          <a:chExt cx="0" cy="0"/>
+        </a:xfrm>
+      </p:grpSpPr>
+      <p:sp>
+        <p:nvSpPr>
+          <p:cNvPr id="2" name="Slide Image Placeholder 1"/>
+          <p:cNvSpPr>
+            <a:spLocks noGrp="1" noRot="1" noChangeAspect="1"/>
+          </p:cNvSpPr>
+          <p:nvPr>
+            <p:ph type="sldImg"/>
+          </p:nvPr>
+        </p:nvSpPr>
+        <p:spPr/>
+      </p:sp>
+      <p:sp>
+        <p:nvSpPr>
+          <p:cNvPr id="3" name="Notes Placeholder 2"/>
+          <p:cNvSpPr>
+            <a:spLocks noGrp="1"/>
+          </p:cNvSpPr>
+          <p:nvPr>
+            <p:ph type="body" idx="1"/>
+          </p:nvPr>
+        </p:nvSpPr>
+        <p:spPr/>
+        <p:txBody>
+          <a:bodyPr/>
+          <a:lstStyle/>
+          <a:p>
+            <a:pPr rtl="0"/>
+            <a:r>
+              <a:rPr lang="en-US" sz="900" b="1" dirty="0" smtClean="0">
+                <a:effectLst/>
+                <a:latin typeface="Segoe UI" panose="020B0502040204020203" pitchFamily="34" charset="0"/>
+              </a:rPr>
+              <a:t>Slide Objectives:</a:t>
+            </a:r>
+            <a:endParaRPr lang="en-US" sz="900" dirty="0" smtClean="0">
+              <a:effectLst/>
+            </a:endParaRPr>
+          </a:p>
+          <a:p>
+            <a:pPr rtl="0"/>
+            <a:r>
+              <a:rPr lang="en-US" sz="900" dirty="0" smtClean="0">
+                <a:effectLst/>
+                <a:latin typeface="Segoe UI" panose="020B0502040204020203" pitchFamily="34" charset="0"/>
+              </a:rPr>
+              <a:t>Point</a:t>
+            </a:r>
+            <a:r>
+              <a:rPr lang="en-US" sz="900" baseline="0" dirty="0" smtClean="0">
+                <a:effectLst/>
+                <a:latin typeface="Segoe UI" panose="020B0502040204020203" pitchFamily="34" charset="0"/>
+              </a:rPr>
+              <a:t> out SQL Reporting pricing</a:t>
+            </a:r>
+            <a:endParaRPr lang="en-US" sz="900" dirty="0" smtClean="0">
+              <a:effectLst/>
+            </a:endParaRPr>
+          </a:p>
+          <a:p>
+            <a:pPr rtl="0"/>
+            <a:r>
+              <a:rPr lang="en-US" sz="900" b="1" dirty="0" smtClean="0">
+                <a:effectLst/>
+                <a:latin typeface="Segoe UI" panose="020B0502040204020203" pitchFamily="34" charset="0"/>
+              </a:rPr>
+              <a:t>Transition:</a:t>
+            </a:r>
+            <a:endParaRPr lang="en-US" sz="900" dirty="0" smtClean="0">
+              <a:effectLst/>
+            </a:endParaRPr>
+          </a:p>
+          <a:p>
+            <a:pPr rtl="0"/>
+            <a:r>
+              <a:rPr lang="en-US" dirty="0" smtClean="0"/>
+              <a:t>Like other services on the Windows Azure Platform, SQL Reporting is designed to support elastic scale. You only pay for what you use and can add or release excess capacity, depending on your needs. Based on your day-to-day, month-to-month, or seasonal requirements, you can easily and quickly add subscriptions and report servers to extend the capacity of your SQL Reporting environment and delete subscriptions and servers to decrease it.</a:t>
+            </a:r>
+            <a:endParaRPr lang="en-US" sz="900" dirty="0" smtClean="0">
+              <a:effectLst/>
+            </a:endParaRPr>
+          </a:p>
+          <a:p>
+            <a:pPr rtl="0"/>
+            <a:r>
+              <a:rPr lang="en-US" sz="900" b="1" dirty="0" smtClean="0">
+                <a:effectLst/>
+                <a:latin typeface="Segoe UI" panose="020B0502040204020203" pitchFamily="34" charset="0"/>
+              </a:rPr>
+              <a:t>Speaking Points:</a:t>
+            </a:r>
+            <a:endParaRPr lang="en-US" sz="900" dirty="0" smtClean="0">
+              <a:effectLst/>
+            </a:endParaRPr>
+          </a:p>
+          <a:p>
+            <a:pPr rtl="0"/>
+            <a:r>
+              <a:rPr lang="en-US" dirty="0" smtClean="0"/>
+              <a:t>$0.88 per hour per reporting instance</a:t>
+            </a:r>
+          </a:p>
+          <a:p>
+            <a:pPr rtl="0"/>
+            <a:r>
+              <a:rPr lang="en-US" sz="900" dirty="0" smtClean="0">
+                <a:effectLst/>
+              </a:rPr>
+              <a:t>1 Reporting</a:t>
+            </a:r>
+            <a:r>
+              <a:rPr lang="en-US" sz="900" baseline="0" dirty="0" smtClean="0">
+                <a:effectLst/>
+              </a:rPr>
+              <a:t> Server instance for 1 day, staying within the 200 reports per hour = $21.12</a:t>
+            </a:r>
+            <a:endParaRPr lang="en-US" sz="900" dirty="0" smtClean="0">
+              <a:effectLst/>
+            </a:endParaRPr>
+          </a:p>
+          <a:p>
+            <a:pPr rtl="0"/>
+            <a:r>
+              <a:rPr lang="en-US" sz="900" b="1" dirty="0" smtClean="0">
+                <a:effectLst/>
+                <a:latin typeface="Segoe UI" panose="020B0502040204020203" pitchFamily="34" charset="0"/>
+              </a:rPr>
+              <a:t>Notes:</a:t>
+            </a:r>
+            <a:endParaRPr lang="en-US" sz="900" dirty="0" smtClean="0">
+              <a:effectLst/>
+            </a:endParaRPr>
+          </a:p>
+          <a:p>
+            <a:pPr marL="0" indent="0">
+              <a:buNone/>
+            </a:pPr>
+            <a:r>
+              <a:rPr lang="en-US" dirty="0" smtClean="0"/>
+              <a:t>For example, if you deployed 1 reporting instance for 1 day during the billing cycle and during that 1 day you stayed within 200 reports per hour except for one hour, where you initiated 250 reports, you would pay $22.00. </a:t>
+            </a:r>
+            <a:endParaRPr lang="en-US" sz="900" dirty="0" smtClean="0"/>
+          </a:p>
+          <a:p>
+            <a:endParaRPr lang="en-US" dirty="0"/>
+          </a:p>
+        </p:txBody>
+      </p:sp>
+      <p:sp>
+        <p:nvSpPr>
+          <p:cNvPr id="4" name="Slide Number Placeholder 3"/>
+          <p:cNvSpPr>
+            <a:spLocks noGrp="1"/>
+          </p:cNvSpPr>
+          <p:nvPr>
+            <p:ph type="sldNum" sz="quarter" idx="10"/>
+          </p:nvPr>
+        </p:nvSpPr>
+        <p:spPr/>
+        <p:txBody>
+          <a:bodyPr/>
+          <a:lstStyle/>
+          <a:p>
+            <a:fld id="{8B263312-38AA-4E1E-B2B5-0F8F122B24FE}" type="slidenum">
+              <a:rPr lang="en-US" smtClean="0"/>
+              <a:pPr/>
+              <a:t>21</a:t>
+            </a:fld>
+            <a:endParaRPr lang="en-US" dirty="0"/>
+          </a:p>
+        </p:txBody>
+      </p:sp>
+    </p:spTree>
+    <p:extLst>
+      <p:ext uri="{BB962C8B-B14F-4D97-AF65-F5344CB8AC3E}">
+        <p14:creationId xmlns:p14="http://schemas.microsoft.com/office/powerpoint/2010/main" val="2781550921"/>
+      </p:ext>
+    </p:extLst>
+  </p:cSld>
+  <p:clrMapOvr>
+    <a:masterClrMapping/>
+  </p:clrMapOvr>
+</p:notes>
+</file>
+
 <file path=ppt/notesSlides/notesSlide2.xml><?xml version="1.0" encoding="utf-8"?>
 <p:notes xmlns:a="http://schemas.openxmlformats.org/drawingml/2006/main" xmlns:r="http://schemas.openxmlformats.org/officeDocument/2006/relationships" xmlns:p="http://schemas.openxmlformats.org/presentationml/2006/main">
   <p:cSld>
@@ -3602,6 +4576,60 @@
           <a:bodyPr/>
           <a:lstStyle/>
           <a:p>
+            <a:pPr rtl="0"/>
+            <a:r>
+              <a:rPr lang="en-US" b="1" dirty="0" smtClean="0">
+                <a:effectLst/>
+                <a:latin typeface="Segoe UI" panose="020B0502040204020203" pitchFamily="34" charset="0"/>
+              </a:rPr>
+              <a:t>Slide </a:t>
+            </a:r>
+            <a:r>
+              <a:rPr lang="en-US" b="1" dirty="0" smtClean="0">
+                <a:effectLst/>
+                <a:latin typeface="Segoe UI" panose="020B0502040204020203" pitchFamily="34" charset="0"/>
+              </a:rPr>
+              <a:t>Objectives:</a:t>
+            </a:r>
+            <a:endParaRPr lang="en-US" dirty="0" smtClean="0">
+              <a:effectLst/>
+            </a:endParaRPr>
+          </a:p>
+          <a:p>
+            <a:pPr rtl="0"/>
+            <a:r>
+              <a:rPr lang="en-US" dirty="0" smtClean="0">
+                <a:effectLst/>
+                <a:latin typeface="Segoe UI" panose="020B0502040204020203" pitchFamily="34" charset="0"/>
+              </a:rPr>
+              <a:t>Provide</a:t>
+            </a:r>
+            <a:r>
+              <a:rPr lang="en-US" baseline="0" dirty="0" smtClean="0">
+                <a:effectLst/>
+                <a:latin typeface="Segoe UI" panose="020B0502040204020203" pitchFamily="34" charset="0"/>
+              </a:rPr>
+              <a:t> a foundation and some background into the purposes behind SQL Reporting</a:t>
+            </a:r>
+            <a:endParaRPr lang="en-US" dirty="0" smtClean="0">
+              <a:effectLst/>
+            </a:endParaRPr>
+          </a:p>
+          <a:p>
+            <a:pPr rtl="0"/>
+            <a:r>
+              <a:rPr lang="en-US" b="1" dirty="0" smtClean="0">
+                <a:effectLst/>
+                <a:latin typeface="Segoe UI" panose="020B0502040204020203" pitchFamily="34" charset="0"/>
+              </a:rPr>
+              <a:t>Transition:</a:t>
+            </a:r>
+            <a:endParaRPr lang="en-US" dirty="0" smtClean="0">
+              <a:effectLst/>
+            </a:endParaRPr>
+          </a:p>
+          <a:p>
+            <a:pPr rtl="0"/>
             <a:r>
               <a:rPr lang="en-US" dirty="0" smtClean="0"/>
               <a:t>It</a:t>
@@ -3610,6 +4638,103 @@
               <a:rPr lang="en-US" baseline="0" dirty="0" smtClean="0"/>
               <a:t> all begins with SSRS a product you already know, and we made with work with Azure. Then we made a way for you to interact with the engine (the SQL Reporting service), then we added SQL Azure connectivity, the ability to use SQL Azure for your reports, then we made it available in our world-wide data centers to it’s available to you around the world.</a:t>
             </a:r>
+            <a:endParaRPr lang="en-US" dirty="0" smtClean="0">
+              <a:effectLst/>
+            </a:endParaRPr>
+          </a:p>
+          <a:p>
+            <a:pPr rtl="0"/>
+            <a:r>
+              <a:rPr lang="en-US" b="1" dirty="0" smtClean="0">
+                <a:effectLst/>
+                <a:latin typeface="Segoe UI" panose="020B0502040204020203" pitchFamily="34" charset="0"/>
+              </a:rPr>
+              <a:t>Speaking Points:</a:t>
+            </a:r>
+            <a:endParaRPr lang="en-US" dirty="0" smtClean="0">
+              <a:effectLst/>
+            </a:endParaRPr>
+          </a:p>
+          <a:p>
+            <a:pPr rtl="0"/>
+            <a:r>
+              <a:rPr lang="en-US" dirty="0" smtClean="0">
+                <a:effectLst/>
+                <a:latin typeface="Segoe UI" panose="020B0502040204020203" pitchFamily="34" charset="0"/>
+              </a:rPr>
+              <a:t>Based on</a:t>
+            </a:r>
+            <a:r>
+              <a:rPr lang="en-US" baseline="0" dirty="0" smtClean="0">
+                <a:effectLst/>
+                <a:latin typeface="Segoe UI" panose="020B0502040204020203" pitchFamily="34" charset="0"/>
+              </a:rPr>
+              <a:t> existing SQL Server Reporting technology provided as a service</a:t>
+            </a:r>
+            <a:endParaRPr lang="en-US" dirty="0" smtClean="0">
+              <a:effectLst/>
+            </a:endParaRPr>
+          </a:p>
+          <a:p>
+            <a:pPr rtl="0"/>
+            <a:r>
+              <a:rPr lang="en-US" dirty="0" smtClean="0">
+                <a:effectLst/>
+                <a:latin typeface="Segoe UI" panose="020B0502040204020203" pitchFamily="34" charset="0"/>
+              </a:rPr>
+              <a:t>Available in the existing portal, but not yet in</a:t>
+            </a:r>
+            <a:r>
+              <a:rPr lang="en-US" baseline="0" dirty="0" smtClean="0">
+                <a:effectLst/>
+                <a:latin typeface="Segoe UI" panose="020B0502040204020203" pitchFamily="34" charset="0"/>
+              </a:rPr>
+              <a:t> the Preview portal</a:t>
+            </a:r>
+          </a:p>
+          <a:p>
+            <a:pPr rtl="0"/>
+            <a:r>
+              <a:rPr lang="en-US" baseline="0" dirty="0" smtClean="0">
+                <a:effectLst/>
+                <a:latin typeface="Segoe UI" panose="020B0502040204020203" pitchFamily="34" charset="0"/>
+              </a:rPr>
+              <a:t>Available Worldwide</a:t>
+            </a:r>
+            <a:endParaRPr lang="en-US" dirty="0" smtClean="0">
+              <a:effectLst/>
+            </a:endParaRPr>
+          </a:p>
+          <a:p>
+            <a:pPr rtl="0"/>
+            <a:r>
+              <a:rPr lang="en-US" b="1" dirty="0" smtClean="0">
+                <a:effectLst/>
+                <a:latin typeface="Segoe UI" panose="020B0502040204020203" pitchFamily="34" charset="0"/>
+              </a:rPr>
+              <a:t>Notes:</a:t>
+            </a:r>
+            <a:endParaRPr lang="en-US" dirty="0" smtClean="0">
+              <a:effectLst/>
+            </a:endParaRPr>
+          </a:p>
+          <a:p>
+            <a:pPr rtl="0"/>
+            <a:r>
+              <a:rPr lang="en-US" dirty="0" smtClean="0">
+                <a:effectLst/>
+                <a:latin typeface="Segoe UI" panose="020B0502040204020203" pitchFamily="34" charset="0"/>
+              </a:rPr>
+              <a:t>Any notes go here</a:t>
+            </a:r>
+            <a:endParaRPr lang="en-US" dirty="0" smtClean="0">
+              <a:effectLst/>
+            </a:endParaRPr>
+          </a:p>
+          <a:p>
+            <a:endParaRPr lang="en-US" dirty="0" smtClean="0"/>
+          </a:p>
+          <a:p>
             <a:endParaRPr lang="en-US" dirty="0"/>
           </a:p>
         </p:txBody>
@@ -3694,6 +4819,148 @@
         <p:txBody>
           <a:bodyPr/>
           <a:lstStyle/>
+          <a:p>
+            <a:pPr rtl="0"/>
+            <a:r>
+              <a:rPr lang="en-US" b="1" dirty="0" smtClean="0">
+                <a:effectLst/>
+                <a:latin typeface="Segoe UI" panose="020B0502040204020203" pitchFamily="34" charset="0"/>
+              </a:rPr>
+              <a:t>Slide Objectives:</a:t>
+            </a:r>
+            <a:endParaRPr lang="en-US" dirty="0" smtClean="0">
+              <a:effectLst/>
+            </a:endParaRPr>
+          </a:p>
+          <a:p>
+            <a:pPr rtl="0"/>
+            <a:r>
+              <a:rPr lang="en-US" dirty="0" smtClean="0">
+                <a:effectLst/>
+                <a:latin typeface="Segoe UI" panose="020B0502040204020203" pitchFamily="34" charset="0"/>
+              </a:rPr>
+              <a:t>Highlight</a:t>
+            </a:r>
+            <a:r>
+              <a:rPr lang="en-US" baseline="0" dirty="0" smtClean="0">
+                <a:effectLst/>
+                <a:latin typeface="Segoe UI" panose="020B0502040204020203" pitchFamily="34" charset="0"/>
+              </a:rPr>
+              <a:t> the great SQL Reporting benefits</a:t>
+            </a:r>
+            <a:endParaRPr lang="en-US" dirty="0" smtClean="0">
+              <a:effectLst/>
+            </a:endParaRPr>
+          </a:p>
+          <a:p>
+            <a:pPr rtl="0"/>
+            <a:r>
+              <a:rPr lang="en-US" b="1" dirty="0" smtClean="0">
+                <a:effectLst/>
+                <a:latin typeface="Segoe UI" panose="020B0502040204020203" pitchFamily="34" charset="0"/>
+              </a:rPr>
+              <a:t>Transition:</a:t>
+            </a:r>
+            <a:endParaRPr lang="en-US" dirty="0" smtClean="0">
+              <a:effectLst/>
+            </a:endParaRPr>
+          </a:p>
+          <a:p>
+            <a:pPr rtl="0"/>
+            <a:r>
+              <a:rPr lang="en-US" dirty="0" smtClean="0">
+                <a:effectLst/>
+                <a:latin typeface="Segoe UI" panose="020B0502040204020203" pitchFamily="34" charset="0"/>
+              </a:rPr>
+              <a:t>SQL Reporting</a:t>
+            </a:r>
+            <a:r>
+              <a:rPr lang="en-US" baseline="0" dirty="0" smtClean="0">
+                <a:effectLst/>
+                <a:latin typeface="Segoe UI" panose="020B0502040204020203" pitchFamily="34" charset="0"/>
+              </a:rPr>
+              <a:t> provides a plethora of high-valued benefits in addition to the fact that </a:t>
+            </a:r>
+            <a:r>
+              <a:rPr lang="en-US" dirty="0" smtClean="0">
+                <a:effectLst/>
+                <a:latin typeface="Segoe UI" panose="020B0502040204020203" pitchFamily="34" charset="0"/>
+              </a:rPr>
+              <a:t>it </a:t>
+            </a:r>
+            <a:r>
+              <a:rPr lang="en-US" baseline="0" dirty="0" smtClean="0">
+                <a:effectLst/>
+                <a:latin typeface="Segoe UI" panose="020B0502040204020203" pitchFamily="34" charset="0"/>
+              </a:rPr>
+              <a:t>is based on well established SQL Server Reporting Services. These benefits are simply the result that SQL Reporting </a:t>
+            </a:r>
+            <a:endParaRPr lang="en-US" dirty="0" smtClean="0">
+              <a:effectLst/>
+            </a:endParaRPr>
+          </a:p>
+          <a:p>
+            <a:pPr rtl="0"/>
+            <a:r>
+              <a:rPr lang="en-US" b="1" dirty="0" smtClean="0">
+                <a:effectLst/>
+                <a:latin typeface="Segoe UI" panose="020B0502040204020203" pitchFamily="34" charset="0"/>
+              </a:rPr>
+              <a:t>Speaking Points:</a:t>
+            </a:r>
+            <a:endParaRPr lang="en-US" dirty="0" smtClean="0">
+              <a:effectLst/>
+            </a:endParaRPr>
+          </a:p>
+          <a:p>
+            <a:pPr rtl="0"/>
+            <a:r>
+              <a:rPr lang="en-US" dirty="0" smtClean="0"/>
+              <a:t>SQL Reporting is based on the Windows Azure Platform and uses the same architecture for scalability and high availability for report servers</a:t>
+            </a:r>
+          </a:p>
+          <a:p>
+            <a:pPr rtl="0"/>
+            <a:r>
+              <a:rPr lang="en-US" dirty="0" smtClean="0"/>
+              <a:t>Create or delete your report servers in minutes, as needed by your business cycle. To further support scalability, you can choose from one of the globally distributed data centers.</a:t>
+            </a:r>
+            <a:endParaRPr lang="en-US" dirty="0" smtClean="0">
+              <a:effectLst/>
+            </a:endParaRPr>
+          </a:p>
+          <a:p>
+            <a:pPr rtl="0"/>
+            <a:r>
+              <a:rPr lang="en-US" dirty="0" smtClean="0"/>
+              <a:t>SQL Reporting is designed to support elastic scale. You only pay for what you use and can add or release excess capacity, depending on your needs. </a:t>
+            </a:r>
+            <a:endParaRPr lang="en-US" dirty="0" smtClean="0">
+              <a:effectLst/>
+            </a:endParaRPr>
+          </a:p>
+          <a:p>
+            <a:pPr rtl="0"/>
+            <a:r>
+              <a:rPr lang="en-US" b="1" dirty="0" smtClean="0">
+                <a:effectLst/>
+                <a:latin typeface="Segoe UI" panose="020B0502040204020203" pitchFamily="34" charset="0"/>
+              </a:rPr>
+              <a:t>Notes:</a:t>
+            </a:r>
+            <a:endParaRPr lang="en-US" dirty="0" smtClean="0">
+              <a:effectLst/>
+            </a:endParaRPr>
+          </a:p>
+          <a:p>
+            <a:pPr rtl="0"/>
+            <a:endParaRPr lang="en-US" dirty="0" smtClean="0">
+              <a:effectLst/>
+            </a:endParaRPr>
+          </a:p>
+          <a:p>
+            <a:endParaRPr lang="en-US" dirty="0" smtClean="0"/>
+          </a:p>
           <a:p>
             <a:endParaRPr lang="en-US" dirty="0"/>
           </a:p>
@@ -3785,6 +5052,86 @@
           <a:bodyPr/>
           <a:lstStyle/>
           <a:p>
+            <a:pPr rtl="0"/>
+            <a:r>
+              <a:rPr lang="en-US" b="1" dirty="0" smtClean="0">
+                <a:effectLst/>
+                <a:latin typeface="Segoe UI" panose="020B0502040204020203" pitchFamily="34" charset="0"/>
+              </a:rPr>
+              <a:t>Slide </a:t>
+            </a:r>
+            <a:r>
+              <a:rPr lang="en-US" b="1" dirty="0" smtClean="0">
+                <a:effectLst/>
+                <a:latin typeface="Segoe UI" panose="020B0502040204020203" pitchFamily="34" charset="0"/>
+              </a:rPr>
+              <a:t>Objectives:</a:t>
+            </a:r>
+            <a:endParaRPr lang="en-US" dirty="0" smtClean="0">
+              <a:effectLst/>
+            </a:endParaRPr>
+          </a:p>
+          <a:p>
+            <a:pPr rtl="0"/>
+            <a:r>
+              <a:rPr lang="en-US" dirty="0" smtClean="0">
+                <a:effectLst/>
+                <a:latin typeface="Segoe UI" panose="020B0502040204020203" pitchFamily="34" charset="0"/>
+              </a:rPr>
+              <a:t>Understand</a:t>
+            </a:r>
+            <a:r>
+              <a:rPr lang="en-US" baseline="0" dirty="0" smtClean="0">
+                <a:effectLst/>
+                <a:latin typeface="Segoe UI" panose="020B0502040204020203" pitchFamily="34" charset="0"/>
+              </a:rPr>
+              <a:t> the underlying SQL Reporting architecture and its interaction with the other Windows Azure services.</a:t>
+            </a:r>
+            <a:endParaRPr lang="en-US" dirty="0" smtClean="0">
+              <a:effectLst/>
+            </a:endParaRPr>
+          </a:p>
+          <a:p>
+            <a:pPr rtl="0"/>
+            <a:r>
+              <a:rPr lang="en-US" b="1" dirty="0" smtClean="0">
+                <a:effectLst/>
+                <a:latin typeface="Segoe UI" panose="020B0502040204020203" pitchFamily="34" charset="0"/>
+              </a:rPr>
+              <a:t>Transition:</a:t>
+            </a:r>
+            <a:endParaRPr lang="en-US" dirty="0" smtClean="0">
+              <a:effectLst/>
+            </a:endParaRPr>
+          </a:p>
+          <a:p>
+            <a:pPr rtl="0"/>
+            <a:r>
+              <a:rPr lang="en-US" dirty="0" smtClean="0"/>
+              <a:t>Although SQL Reporting</a:t>
+            </a:r>
+            <a:r>
+              <a:rPr lang="en-US" baseline="0" dirty="0" smtClean="0"/>
+              <a:t> is based on SQL Server Reporting technology, the architecture is different in order to take advantage of the many benefits of the Windows Azure platform and services.</a:t>
+            </a:r>
+            <a:endParaRPr lang="en-US" dirty="0" smtClean="0">
+              <a:effectLst/>
+            </a:endParaRPr>
+          </a:p>
+          <a:p>
+            <a:pPr rtl="0"/>
+            <a:r>
+              <a:rPr lang="en-US" b="1" dirty="0" smtClean="0">
+                <a:effectLst/>
+                <a:latin typeface="Segoe UI" panose="020B0502040204020203" pitchFamily="34" charset="0"/>
+              </a:rPr>
+              <a:t>Speaking Points:</a:t>
+            </a:r>
+            <a:endParaRPr lang="en-US" dirty="0" smtClean="0">
+              <a:effectLst/>
+            </a:endParaRPr>
+          </a:p>
+          <a:p>
             <a:pPr marL="228600" marR="0" indent="-228600" algn="l" defTabSz="914400" rtl="0" eaLnBrk="1" fontAlgn="base" latinLnBrk="0" hangingPunct="1">
               <a:lnSpc>
                 <a:spcPct val="100000"/>
@@ -3889,7 +5236,7 @@
             </a:r>
             <a:r>
               <a:rPr lang="en-US" baseline="0" dirty="0" smtClean="0"/>
-              <a:t> database…since it is built </a:t>
+              <a:t> database…since it is built on SQL Database technology</a:t>
             </a:r>
           </a:p>
           <a:p>
@@ -3910,7 +5257,10 @@
               <a:tabLst/>
               <a:defRPr/>
             </a:pPr>
-            <a:endParaRPr lang="en-US" baseline="0" dirty="0" smtClean="0"/>
+            <a:r>
+              <a:rPr lang="en-US" baseline="0" dirty="0" smtClean="0"/>
+              <a:t>Data tier used for SQL Reporting is SQL Database.</a:t>
+            </a:r>
           </a:p>
           <a:p>
             <a:pPr marL="228600" marR="0" indent="-228600" algn="l" defTabSz="914400" rtl="0" eaLnBrk="1" fontAlgn="base" latinLnBrk="0" hangingPunct="1">
@@ -3932,7 +5282,7 @@
             </a:pPr>
             <a:r>
               <a:rPr lang="en-US" baseline="0" dirty="0" smtClean="0"/>
-              <a:t>Built on top of SQL Database…data tier used for SQL Reporting is SQL Database.</a:t>
+              <a:t>Application tier is built on Windows Azure for scalability</a:t>
             </a:r>
           </a:p>
           <a:p>
@@ -3955,29 +5305,6 @@
             </a:pPr>
             <a:r>
               <a:rPr lang="en-US" baseline="0" dirty="0" smtClean="0"/>
-              <a:t>Application tier is built on Windows Azure for scalability</a:t>
-            </a:r>
-          </a:p>
-          <a:p>
-            <a:pPr marL="228600" marR="0" indent="-228600" algn="l" defTabSz="914400" rtl="0" eaLnBrk="1" fontAlgn="base" latinLnBrk="0" hangingPunct="1">
-              <a:lnSpc>
-                <a:spcPct val="100000"/>
-              </a:lnSpc>
-              <a:spcBef>
-                <a:spcPct val="30000"/>
-              </a:spcBef>
-              <a:spcAft>
-                <a:spcPct val="0"/>
-              </a:spcAft>
-              <a:buClrTx/>
-              <a:buSzTx/>
-              <a:buFontTx/>
-              <a:buAutoNum type="arabicParenR"/>
-              <a:tabLst/>
-              <a:defRPr/>
-            </a:pPr>
-            <a:r>
-              <a:rPr lang="en-US" baseline="0" dirty="0" smtClean="0"/>
               <a:t>Security – authentication mechanism is basic </a:t>
             </a:r>
             <a:r>
@@ -3986,8 +5313,40 @@
             </a:r>
             <a:r>
               <a:rPr lang="en-US" baseline="0" dirty="0" smtClean="0"/>
-              <a:t> – because reporting is built on SQL Database…inherit a lot of the security mechanisms...</a:t>
-            </a:r>
+              <a:t> – because reporting is built on SQL Database…inherits a lot of the same security mechanisms.</a:t>
+            </a:r>
+            <a:endParaRPr lang="en-US" dirty="0" smtClean="0">
+              <a:effectLst/>
+            </a:endParaRPr>
+          </a:p>
+          <a:p>
+            <a:pPr rtl="0"/>
+            <a:r>
+              <a:rPr lang="en-US" b="1" dirty="0" smtClean="0">
+                <a:effectLst/>
+                <a:latin typeface="Segoe UI" panose="020B0502040204020203" pitchFamily="34" charset="0"/>
+              </a:rPr>
+              <a:t>Notes:</a:t>
+            </a:r>
+            <a:endParaRPr lang="en-US" dirty="0" smtClean="0">
+              <a:effectLst/>
+            </a:endParaRPr>
+          </a:p>
+          <a:p>
+            <a:pPr rtl="0"/>
+            <a:r>
+              <a:rPr lang="en-US" dirty="0" smtClean="0">
+                <a:effectLst/>
+                <a:latin typeface="Segoe UI" panose="020B0502040204020203" pitchFamily="34" charset="0"/>
+              </a:rPr>
+              <a:t>Any notes go here</a:t>
+            </a:r>
+            <a:endParaRPr lang="en-US" dirty="0" smtClean="0">
+              <a:effectLst/>
+            </a:endParaRPr>
+          </a:p>
+          <a:p>
+            <a:endParaRPr lang="en-US" dirty="0" smtClean="0"/>
           </a:p>
           <a:p>
             <a:pPr marL="0" marR="0" indent="0" algn="l" defTabSz="914400" rtl="0" eaLnBrk="1" fontAlgn="base" latinLnBrk="0" hangingPunct="1">
@@ -4100,6 +5459,92 @@
           <a:bodyPr/>
           <a:lstStyle/>
           <a:p>
+            <a:pPr rtl="0"/>
+            <a:r>
+              <a:rPr lang="en-US" b="1" dirty="0" smtClean="0">
+                <a:effectLst/>
+                <a:latin typeface="Segoe UI" panose="020B0502040204020203" pitchFamily="34" charset="0"/>
+              </a:rPr>
+              <a:t>Slide </a:t>
+            </a:r>
+            <a:r>
+              <a:rPr lang="en-US" b="1" dirty="0" smtClean="0">
+                <a:effectLst/>
+                <a:latin typeface="Segoe UI" panose="020B0502040204020203" pitchFamily="34" charset="0"/>
+              </a:rPr>
+              <a:t>Objectives:</a:t>
+            </a:r>
+            <a:endParaRPr lang="en-US" dirty="0" smtClean="0">
+              <a:effectLst/>
+            </a:endParaRPr>
+          </a:p>
+          <a:p>
+            <a:pPr rtl="0"/>
+            <a:r>
+              <a:rPr lang="en-US" dirty="0" smtClean="0">
+                <a:effectLst/>
+                <a:latin typeface="Segoe UI" panose="020B0502040204020203" pitchFamily="34" charset="0"/>
+              </a:rPr>
+              <a:t>Highlight</a:t>
+            </a:r>
+            <a:r>
+              <a:rPr lang="en-US" baseline="0" dirty="0" smtClean="0">
+                <a:effectLst/>
+                <a:latin typeface="Segoe UI" panose="020B0502040204020203" pitchFamily="34" charset="0"/>
+              </a:rPr>
+              <a:t> the key features of SQL Reporting</a:t>
+            </a:r>
+            <a:endParaRPr lang="en-US" dirty="0" smtClean="0">
+              <a:effectLst/>
+            </a:endParaRPr>
+          </a:p>
+          <a:p>
+            <a:pPr rtl="0"/>
+            <a:r>
+              <a:rPr lang="en-US" b="1" dirty="0" smtClean="0">
+                <a:effectLst/>
+                <a:latin typeface="Segoe UI" panose="020B0502040204020203" pitchFamily="34" charset="0"/>
+              </a:rPr>
+              <a:t>Transition:</a:t>
+            </a:r>
+            <a:endParaRPr lang="en-US" dirty="0" smtClean="0">
+              <a:effectLst/>
+            </a:endParaRPr>
+          </a:p>
+          <a:p>
+            <a:pPr rtl="0"/>
+            <a:r>
+              <a:rPr lang="en-US" dirty="0" smtClean="0">
+                <a:effectLst/>
+                <a:latin typeface="Segoe UI" panose="020B0502040204020203" pitchFamily="34" charset="0"/>
+              </a:rPr>
+              <a:t>While many of the great SQL Reporting features have</a:t>
+            </a:r>
+            <a:r>
+              <a:rPr lang="en-US" baseline="0" dirty="0" smtClean="0">
+                <a:effectLst/>
+                <a:latin typeface="Segoe UI" panose="020B0502040204020203" pitchFamily="34" charset="0"/>
+              </a:rPr>
+              <a:t> their roots coming from SQL Server Reporting, other key features come from the simple fact that SQL Reporting can take advantage of the Windows Azure platform and services.</a:t>
+            </a:r>
+            <a:endParaRPr lang="en-US" dirty="0" smtClean="0">
+              <a:effectLst/>
+            </a:endParaRPr>
+          </a:p>
+          <a:p>
+            <a:pPr rtl="0"/>
+            <a:r>
+              <a:rPr lang="en-US" b="1" dirty="0" smtClean="0">
+                <a:effectLst/>
+                <a:latin typeface="Segoe UI" panose="020B0502040204020203" pitchFamily="34" charset="0"/>
+              </a:rPr>
+              <a:t>Speaking Points:</a:t>
+            </a:r>
+            <a:endParaRPr lang="en-US" dirty="0" smtClean="0">
+              <a:effectLst/>
+            </a:endParaRPr>
+          </a:p>
+          <a:p>
             <a:pPr>
               <a:lnSpc>
                 <a:spcPct val="100000"/>
@@ -4122,16 +5567,10 @@
             </a:r>
           </a:p>
           <a:p>
-            <a:endParaRPr lang="en-US" dirty="0" smtClean="0"/>
-          </a:p>
-          <a:p>
             <a:r>
               <a:rPr lang="en-US" sz="900" dirty="0" smtClean="0"/>
               <a:t>Administrative overhead removed. No need to procure, license, install or maintain hardware.</a:t>
             </a:r>
-          </a:p>
-          <a:p>
-            <a:endParaRPr lang="en-US" sz="900" dirty="0" smtClean="0"/>
           </a:p>
           <a:p>
             <a:pPr marL="0" marR="0" indent="0" algn="l" defTabSz="914363" rtl="0" eaLnBrk="1" fontAlgn="auto" latinLnBrk="0" hangingPunct="1">
@@ -4157,9 +5596,6 @@
             </a:r>
           </a:p>
           <a:p>
-            <a:endParaRPr lang="en-US" dirty="0" smtClean="0"/>
-          </a:p>
-          <a:p>
             <a:pPr marL="0" marR="0" indent="0" algn="l" defTabSz="914363" rtl="0" eaLnBrk="1" fontAlgn="auto" latinLnBrk="0" hangingPunct="1">
               <a:lnSpc>
                 <a:spcPct val="90000"/>
@@ -4181,6 +5617,85 @@
               <a:rPr lang="en-US" sz="900" dirty="0" smtClean="0"/>
               <a:t>No scalability and high availability management overhead</a:t>
             </a:r>
+          </a:p>
+          <a:p>
+            <a:pPr marL="0" marR="0" indent="0" algn="l" defTabSz="914363" rtl="0" eaLnBrk="1" fontAlgn="auto" latinLnBrk="0" hangingPunct="1">
+              <a:lnSpc>
+                <a:spcPct val="90000"/>
+              </a:lnSpc>
+              <a:spcBef>
+                <a:spcPts val="0"/>
+              </a:spcBef>
+              <a:spcAft>
+                <a:spcPts val="333"/>
+              </a:spcAft>
+              <a:buClrTx/>
+              <a:buSzTx/>
+              <a:buFontTx/>
+              <a:buNone/>
+              <a:tabLst/>
+              <a:defRPr/>
+            </a:pPr>
+            <a:r>
+              <a:rPr lang="en-US" dirty="0" smtClean="0"/>
+              <a:t>Removes administrative overhead. There is no need to procure, license, install or maintain server hardware and software, which allows you to focus on developing and delivering reporting solutions for your users and less on infrastructure.</a:t>
+            </a:r>
+            <a:endParaRPr lang="en-US" sz="900" dirty="0" smtClean="0"/>
+          </a:p>
+          <a:p>
+            <a:pPr marL="0" marR="0" indent="0" algn="l" defTabSz="914363" rtl="0" eaLnBrk="1" fontAlgn="auto" latinLnBrk="0" hangingPunct="1">
+              <a:lnSpc>
+                <a:spcPct val="90000"/>
+              </a:lnSpc>
+              <a:spcBef>
+                <a:spcPts val="0"/>
+              </a:spcBef>
+              <a:spcAft>
+                <a:spcPts val="333"/>
+              </a:spcAft>
+              <a:buClrTx/>
+              <a:buSzTx/>
+              <a:buFontTx/>
+              <a:buNone/>
+              <a:tabLst/>
+              <a:defRPr/>
+            </a:pPr>
+            <a:r>
+              <a:rPr lang="en-US" sz="900" dirty="0" smtClean="0"/>
+              <a:t>99.9 % SLA</a:t>
+            </a:r>
+            <a:endParaRPr lang="en-US" dirty="0" smtClean="0">
+              <a:effectLst/>
+            </a:endParaRPr>
+          </a:p>
+          <a:p>
+            <a:pPr rtl="0"/>
+            <a:r>
+              <a:rPr lang="en-US" b="1" dirty="0" smtClean="0">
+                <a:effectLst/>
+                <a:latin typeface="Segoe UI" panose="020B0502040204020203" pitchFamily="34" charset="0"/>
+              </a:rPr>
+              <a:t>Notes:</a:t>
+            </a:r>
+            <a:endParaRPr lang="en-US" dirty="0" smtClean="0">
+              <a:effectLst/>
+            </a:endParaRPr>
+          </a:p>
+          <a:p>
+            <a:pPr rtl="0"/>
+            <a:r>
+              <a:rPr lang="en-US" dirty="0" smtClean="0">
+                <a:effectLst/>
+                <a:latin typeface="Segoe UI" panose="020B0502040204020203" pitchFamily="34" charset="0"/>
+              </a:rPr>
+              <a:t>Any notes go here</a:t>
+            </a:r>
+            <a:endParaRPr lang="en-US" dirty="0" smtClean="0">
+              <a:effectLst/>
+            </a:endParaRPr>
+          </a:p>
+          <a:p>
+            <a:endParaRPr lang="en-US" dirty="0" smtClean="0"/>
           </a:p>
           <a:p>
             <a:pPr marL="0" marR="0" indent="0" algn="l" defTabSz="914363" rtl="0" eaLnBrk="1" fontAlgn="auto" latinLnBrk="0" hangingPunct="1">
@@ -4201,29 +5716,6 @@
               <a:defRPr/>
             </a:pPr>
             <a:endParaRPr lang="en-US" sz="900" dirty="0" smtClean="0"/>
-          </a:p>
-          <a:p>
-            <a:pPr marL="0" marR="0" indent="0" algn="l" defTabSz="914363" rtl="0" eaLnBrk="1" fontAlgn="auto" latinLnBrk="0" hangingPunct="1">
-              <a:lnSpc>
-                <a:spcPct val="90000"/>
-              </a:lnSpc>
-              <a:spcBef>
-                <a:spcPts val="0"/>
-              </a:spcBef>
-              <a:spcAft>
-                <a:spcPts val="333"/>
-              </a:spcAft>
-              <a:buClrTx/>
-              <a:buSzTx/>
-              <a:buFontTx/>
-              <a:buNone/>
-              <a:tabLst/>
-              <a:defRPr/>
-            </a:pPr>
-            <a:r>
-              <a:rPr lang="en-US" sz="900" dirty="0" smtClean="0"/>
-              <a:t>99.9 % SLA</a:t>
-            </a:r>
           </a:p>
         </p:txBody>
       </p:sp>
@@ -4308,6 +5800,157 @@
           <a:bodyPr/>
           <a:lstStyle/>
           <a:p>
+            <a:pPr rtl="0"/>
+            <a:r>
+              <a:rPr lang="en-US" b="1" dirty="0" smtClean="0">
+                <a:effectLst/>
+                <a:latin typeface="Segoe UI" panose="020B0502040204020203" pitchFamily="34" charset="0"/>
+              </a:rPr>
+              <a:t>Slide Objectives:</a:t>
+            </a:r>
+            <a:endParaRPr lang="en-US" dirty="0" smtClean="0">
+              <a:effectLst/>
+            </a:endParaRPr>
+          </a:p>
+          <a:p>
+            <a:pPr rtl="0"/>
+            <a:r>
+              <a:rPr lang="en-US" dirty="0" smtClean="0">
+                <a:effectLst/>
+                <a:latin typeface="Segoe UI" panose="020B0502040204020203" pitchFamily="34" charset="0"/>
+              </a:rPr>
+              <a:t>Quick feature comparison between</a:t>
+            </a:r>
+            <a:r>
+              <a:rPr lang="en-US" baseline="0" dirty="0" smtClean="0">
+                <a:effectLst/>
+                <a:latin typeface="Segoe UI" panose="020B0502040204020203" pitchFamily="34" charset="0"/>
+              </a:rPr>
+              <a:t> on-premises SQL Server Reporting Services and SQL Reporting</a:t>
+            </a:r>
+            <a:endParaRPr lang="en-US" dirty="0" smtClean="0">
+              <a:effectLst/>
+            </a:endParaRPr>
+          </a:p>
+          <a:p>
+            <a:pPr rtl="0"/>
+            <a:r>
+              <a:rPr lang="en-US" b="1" dirty="0" smtClean="0">
+                <a:effectLst/>
+                <a:latin typeface="Segoe UI" panose="020B0502040204020203" pitchFamily="34" charset="0"/>
+              </a:rPr>
+              <a:t>Transition:</a:t>
+            </a:r>
+            <a:endParaRPr lang="en-US" dirty="0" smtClean="0">
+              <a:effectLst/>
+            </a:endParaRPr>
+          </a:p>
+          <a:p>
+            <a:pPr rtl="0"/>
+            <a:r>
+              <a:rPr lang="en-US" dirty="0" smtClean="0"/>
+              <a:t>The table compares features between SQL Server Reporting Services (SSRS) configured in native mode and SQL Reporting. </a:t>
+            </a:r>
+            <a:endParaRPr lang="en-US" dirty="0" smtClean="0">
+              <a:effectLst/>
+            </a:endParaRPr>
+          </a:p>
+          <a:p>
+            <a:pPr rtl="0"/>
+            <a:r>
+              <a:rPr lang="en-US" b="1" dirty="0" smtClean="0">
+                <a:effectLst/>
+                <a:latin typeface="Segoe UI" panose="020B0502040204020203" pitchFamily="34" charset="0"/>
+              </a:rPr>
+              <a:t>Speaking Points:</a:t>
+            </a:r>
+            <a:endParaRPr lang="en-US" dirty="0" smtClean="0">
+              <a:effectLst/>
+            </a:endParaRPr>
+          </a:p>
+          <a:p>
+            <a:pPr rtl="0"/>
+            <a:r>
+              <a:rPr lang="en-US" dirty="0" smtClean="0">
+                <a:effectLst/>
+                <a:latin typeface="Segoe UI" panose="020B0502040204020203" pitchFamily="34" charset="0"/>
+              </a:rPr>
+              <a:t>Much of the great</a:t>
+            </a:r>
+            <a:r>
+              <a:rPr lang="en-US" baseline="0" dirty="0" smtClean="0">
+                <a:effectLst/>
+                <a:latin typeface="Segoe UI" panose="020B0502040204020203" pitchFamily="34" charset="0"/>
+              </a:rPr>
+              <a:t> tooling experience is supported</a:t>
+            </a:r>
+            <a:endParaRPr lang="en-US" dirty="0" smtClean="0">
+              <a:effectLst/>
+            </a:endParaRPr>
+          </a:p>
+          <a:p>
+            <a:pPr rtl="0"/>
+            <a:r>
+              <a:rPr lang="en-US" dirty="0" smtClean="0">
+                <a:effectLst/>
+                <a:latin typeface="Segoe UI" panose="020B0502040204020203" pitchFamily="34" charset="0"/>
+              </a:rPr>
+              <a:t>Some limitation</a:t>
+            </a:r>
+            <a:r>
+              <a:rPr lang="en-US" baseline="0" dirty="0" smtClean="0">
+                <a:effectLst/>
+                <a:latin typeface="Segoe UI" panose="020B0502040204020203" pitchFamily="34" charset="0"/>
+              </a:rPr>
+              <a:t> in the Data Sources area – only SQL Database is supported in SQL Reporting</a:t>
+            </a:r>
+          </a:p>
+          <a:p>
+            <a:pPr rtl="0"/>
+            <a:r>
+              <a:rPr lang="en-US" dirty="0" smtClean="0">
+                <a:effectLst/>
+              </a:rPr>
+              <a:t>SQL Database authentication. </a:t>
+            </a:r>
+            <a:r>
+              <a:rPr lang="en-US" dirty="0" smtClean="0"/>
+              <a:t>Permissions to reports and report-related items are controlled by role assignment.</a:t>
+            </a:r>
+            <a:endParaRPr lang="en-US" dirty="0" smtClean="0">
+              <a:effectLst/>
+            </a:endParaRPr>
+          </a:p>
+          <a:p>
+            <a:pPr rtl="0"/>
+            <a:r>
+              <a:rPr lang="en-US" b="1" dirty="0" smtClean="0">
+                <a:effectLst/>
+                <a:latin typeface="Segoe UI" panose="020B0502040204020203" pitchFamily="34" charset="0"/>
+              </a:rPr>
+              <a:t>Notes:</a:t>
+            </a:r>
+            <a:endParaRPr lang="en-US" dirty="0" smtClean="0">
+              <a:effectLst/>
+            </a:endParaRPr>
+          </a:p>
+          <a:p>
+            <a:pPr rtl="0"/>
+            <a:r>
+              <a:rPr lang="en-US" dirty="0" smtClean="0"/>
+              <a:t>No extensions are supported in this release.</a:t>
+            </a:r>
+          </a:p>
+          <a:p>
+            <a:pPr rtl="0"/>
+            <a:endParaRPr lang="en-US" dirty="0" smtClean="0">
+              <a:effectLst/>
+            </a:endParaRPr>
+          </a:p>
+          <a:p>
+            <a:endParaRPr lang="en-US" dirty="0" smtClean="0"/>
+          </a:p>
+          <a:p>
             <a:endParaRPr lang="en-US" dirty="0"/>
           </a:p>
         </p:txBody>
@@ -4393,6 +6036,92 @@
           <a:bodyPr/>
           <a:lstStyle/>
           <a:p>
+            <a:pPr rtl="0"/>
+            <a:r>
+              <a:rPr lang="en-US" b="1" dirty="0" smtClean="0">
+                <a:effectLst/>
+                <a:latin typeface="Segoe UI" panose="020B0502040204020203" pitchFamily="34" charset="0"/>
+              </a:rPr>
+              <a:t>Slide </a:t>
+            </a:r>
+            <a:r>
+              <a:rPr lang="en-US" b="1" dirty="0" smtClean="0">
+                <a:effectLst/>
+                <a:latin typeface="Segoe UI" panose="020B0502040204020203" pitchFamily="34" charset="0"/>
+              </a:rPr>
+              <a:t>Objectives:</a:t>
+            </a:r>
+            <a:endParaRPr lang="en-US" dirty="0" smtClean="0">
+              <a:effectLst/>
+            </a:endParaRPr>
+          </a:p>
+          <a:p>
+            <a:pPr rtl="0"/>
+            <a:r>
+              <a:rPr lang="en-US" dirty="0" smtClean="0">
+                <a:effectLst/>
+                <a:latin typeface="Segoe UI" panose="020B0502040204020203" pitchFamily="34" charset="0"/>
+              </a:rPr>
+              <a:t>Understand the SQL Reporting</a:t>
+            </a:r>
+            <a:r>
+              <a:rPr lang="en-US" baseline="0" dirty="0" smtClean="0">
+                <a:effectLst/>
+                <a:latin typeface="Segoe UI" panose="020B0502040204020203" pitchFamily="34" charset="0"/>
+              </a:rPr>
+              <a:t> Security model and how SQL Reporting implements security to ensure data safety</a:t>
+            </a:r>
+            <a:endParaRPr lang="en-US" dirty="0" smtClean="0">
+              <a:effectLst/>
+            </a:endParaRPr>
+          </a:p>
+          <a:p>
+            <a:pPr rtl="0"/>
+            <a:r>
+              <a:rPr lang="en-US" b="1" dirty="0" smtClean="0">
+                <a:effectLst/>
+                <a:latin typeface="Segoe UI" panose="020B0502040204020203" pitchFamily="34" charset="0"/>
+              </a:rPr>
+              <a:t>Transition:</a:t>
+            </a:r>
+            <a:endParaRPr lang="en-US" dirty="0" smtClean="0">
+              <a:effectLst/>
+            </a:endParaRPr>
+          </a:p>
+          <a:p>
+            <a:pPr rtl="0"/>
+            <a:r>
+              <a:rPr lang="en-US" dirty="0" smtClean="0">
+                <a:effectLst/>
+                <a:latin typeface="Segoe UI" panose="020B0502040204020203" pitchFamily="34" charset="0"/>
+              </a:rPr>
+              <a:t>SQL</a:t>
+            </a:r>
+            <a:r>
+              <a:rPr lang="en-US" baseline="0" dirty="0" smtClean="0">
+                <a:effectLst/>
+                <a:latin typeface="Segoe UI" panose="020B0502040204020203" pitchFamily="34" charset="0"/>
+              </a:rPr>
+              <a:t> Reporting follows specific guidelines for managing the security of SQL Reporting report servers, reports, and report-related items.</a:t>
+            </a:r>
+            <a:endParaRPr lang="en-US" dirty="0" smtClean="0">
+              <a:effectLst/>
+            </a:endParaRPr>
+          </a:p>
+          <a:p>
+            <a:pPr rtl="0"/>
+            <a:r>
+              <a:rPr lang="en-US" b="1" dirty="0" smtClean="0">
+                <a:effectLst/>
+                <a:latin typeface="Segoe UI" panose="020B0502040204020203" pitchFamily="34" charset="0"/>
+              </a:rPr>
+              <a:t>Speaking Points:</a:t>
+            </a:r>
+            <a:endParaRPr lang="en-US" dirty="0" smtClean="0">
+              <a:effectLst/>
+            </a:endParaRPr>
+          </a:p>
+          <a:p>
             <a:pPr defTabSz="897301" fontAlgn="base">
               <a:lnSpc>
                 <a:spcPct val="100000"/>
@@ -4407,15 +6136,7 @@
             </a:pPr>
             <a:r>
               <a:rPr lang="en-US" dirty="0" smtClean="0"/>
-              <a:t>Prompt - Alternatively, a report author can set data source credentials to </a:t>
-            </a:r>
-            <a:r>
-              <a:rPr lang="en-US" b="1" dirty="0" smtClean="0"/>
-              <a:t>Prompt</a:t>
-            </a:r>
-            <a:r>
-              <a:rPr lang="en-US" dirty="0" smtClean="0"/>
-              <a:t>. After report readers login to the SQL Reporting portal, they must then type the login user name and password for each data source when they run the report.</a:t>
+              <a:t>Provide report readers with a URL, user name, and password to the report server account.</a:t>
             </a:r>
           </a:p>
           <a:p>
@@ -4431,7 +6152,14 @@
               </a:spcAft>
               <a:defRPr/>
             </a:pPr>
-            <a:endParaRPr lang="en-US" dirty="0" smtClean="0"/>
+            <a:r>
+              <a:rPr lang="en-US" dirty="0" smtClean="0"/>
+              <a:t>Create and deploy shared data sources for reports to a folder on the report server, and to store credentials for each shared data source on the report server.</a:t>
+            </a:r>
+            <a:r>
+              <a:rPr lang="en-US" sz="900" dirty="0" smtClean="0"/>
+              <a:t> </a:t>
+            </a:r>
           </a:p>
           <a:p>
             <a:pPr defTabSz="897301" fontAlgn="base">
@@ -4447,85 +6175,92 @@
               <a:defRPr/>
             </a:pPr>
             <a:r>
-              <a:rPr lang="en-US" sz="900" dirty="0" smtClean="0"/>
-              <a:t>Passwords stored securely on the report server, separate of the .</a:t>
-            </a:r>
-            <a:r>
-              <a:rPr lang="en-US" sz="900" dirty="0" err="1" smtClean="0"/>
-              <a:t>rdl</a:t>
-            </a:r>
-            <a:endParaRPr lang="en-US" sz="900" dirty="0" smtClean="0"/>
-          </a:p>
-          <a:p>
-            <a:pPr defTabSz="897301" fontAlgn="base">
-              <a:lnSpc>
-                <a:spcPct val="100000"/>
-              </a:lnSpc>
-              <a:spcBef>
-                <a:spcPct val="30000"/>
-              </a:spcBef>
-              <a:spcAft>
-                <a:spcPct val="0"/>
-              </a:spcAft>
-              <a:defRPr/>
-            </a:pPr>
-            <a:endParaRPr lang="en-US" sz="900" dirty="0" smtClean="0"/>
-          </a:p>
-          <a:p>
-            <a:pPr defTabSz="897301" fontAlgn="base">
-              <a:lnSpc>
-                <a:spcPct val="100000"/>
-              </a:lnSpc>
-              <a:spcBef>
-                <a:spcPct val="30000"/>
-              </a:spcBef>
-              <a:spcAft>
-                <a:spcPct val="0"/>
-              </a:spcAft>
-              <a:defRPr/>
-            </a:pPr>
-            <a:r>
-              <a:rPr lang="en-US" sz="900" dirty="0" smtClean="0"/>
-              <a:t>Help manage credentials in a single location</a:t>
-            </a:r>
-          </a:p>
-          <a:p>
-            <a:pPr defTabSz="897301" fontAlgn="base">
-              <a:lnSpc>
-                <a:spcPct val="100000"/>
-              </a:lnSpc>
-              <a:spcBef>
-                <a:spcPct val="30000"/>
-              </a:spcBef>
-              <a:spcAft>
-                <a:spcPct val="0"/>
-              </a:spcAft>
-              <a:defRPr/>
-            </a:pPr>
-            <a:endParaRPr lang="en-US" sz="900" dirty="0" smtClean="0"/>
-          </a:p>
-          <a:p>
-            <a:pPr marL="0" marR="0" indent="0" algn="l" defTabSz="897301" rtl="0" eaLnBrk="1" fontAlgn="base" latinLnBrk="0" hangingPunct="1">
-              <a:lnSpc>
-                <a:spcPct val="100000"/>
-              </a:lnSpc>
-              <a:spcBef>
-                <a:spcPct val="30000"/>
-              </a:spcBef>
-              <a:spcAft>
-                <a:spcPct val="0"/>
-              </a:spcAft>
-              <a:buClrTx/>
-              <a:buSzTx/>
-              <a:buFontTx/>
-              <a:buNone/>
-              <a:tabLst/>
-              <a:defRPr/>
-            </a:pPr>
-            <a:r>
-              <a:rPr lang="en-US" sz="900" dirty="0" smtClean="0"/>
-              <a:t>Author and publish reports using familiar tools </a:t>
-            </a:r>
+              <a:rPr lang="en-US" dirty="0" smtClean="0"/>
+              <a:t>Report items inherit security based on report folder permissions, similar behavior</a:t>
+            </a:r>
+            <a:r>
+              <a:rPr lang="en-US" baseline="0" dirty="0" smtClean="0"/>
+              <a:t> as </a:t>
+            </a:r>
+            <a:r>
+              <a:rPr lang="en-US" baseline="0" dirty="0" smtClean="0">
+                <a:effectLst/>
+              </a:rPr>
+              <a:t>SQL Server Reporting.</a:t>
+            </a:r>
+            <a:endParaRPr lang="en-US" dirty="0" smtClean="0">
+              <a:effectLst/>
+            </a:endParaRPr>
+          </a:p>
+          <a:p>
+            <a:pPr rtl="0"/>
+            <a:r>
+              <a:rPr lang="en-US" b="1" dirty="0" smtClean="0">
+                <a:effectLst/>
+                <a:latin typeface="Segoe UI" panose="020B0502040204020203" pitchFamily="34" charset="0"/>
+              </a:rPr>
+              <a:t>Notes</a:t>
+            </a:r>
+            <a:r>
+              <a:rPr lang="en-US" b="1" dirty="0" smtClean="0">
+                <a:effectLst/>
+                <a:latin typeface="Segoe UI" panose="020B0502040204020203" pitchFamily="34" charset="0"/>
+              </a:rPr>
+              <a:t>:</a:t>
+            </a:r>
+            <a:endParaRPr lang="en-US" dirty="0" smtClean="0">
+              <a:effectLst/>
+            </a:endParaRPr>
+          </a:p>
+          <a:p>
+            <a:pPr rtl="0"/>
+            <a:r>
+              <a:rPr lang="en-US" dirty="0" smtClean="0"/>
+              <a:t>Strings such as the report server URL, username, and password, are protected information, and must be stored in the &lt;</a:t>
+            </a:r>
+            <a:r>
+              <a:rPr lang="en-US" dirty="0" err="1" smtClean="0"/>
+              <a:t>appSettings</a:t>
+            </a:r>
+            <a:r>
+              <a:rPr lang="en-US" dirty="0" smtClean="0"/>
+              <a:t>&gt; section in the </a:t>
+            </a:r>
+            <a:r>
+              <a:rPr lang="en-US" dirty="0" err="1" smtClean="0"/>
+              <a:t>Web.config</a:t>
+            </a:r>
+            <a:r>
+              <a:rPr lang="en-US" dirty="0" smtClean="0"/>
+              <a:t> or </a:t>
+            </a:r>
+            <a:r>
+              <a:rPr lang="en-US" dirty="0" err="1" smtClean="0"/>
+              <a:t>App.config</a:t>
+            </a:r>
+            <a:r>
+              <a:rPr lang="en-US" dirty="0" smtClean="0"/>
+              <a:t> file of your application. As a best practice, encrypt this data in your configuration file.</a:t>
+            </a:r>
+          </a:p>
+          <a:p>
+            <a:pPr rtl="0"/>
+            <a:endParaRPr lang="en-US" dirty="0" smtClean="0">
+              <a:effectLst/>
+            </a:endParaRPr>
+          </a:p>
+          <a:p>
+            <a:pPr rtl="0"/>
+            <a:r>
+              <a:rPr lang="en-US" dirty="0" smtClean="0"/>
+              <a:t>If you assign specific permissions to a folder, you break the inheritance for permissions in the folder hierarchy.</a:t>
+            </a:r>
+            <a:endParaRPr lang="en-US" dirty="0" smtClean="0">
+              <a:effectLst/>
+            </a:endParaRPr>
+          </a:p>
+          <a:p>
+            <a:endParaRPr lang="en-US" dirty="0" smtClean="0"/>
           </a:p>
           <a:p>
             <a:pPr defTabSz="897301" fontAlgn="base">
@@ -4625,19 +6360,146 @@
           <a:bodyPr/>
           <a:lstStyle/>
           <a:p>
-            <a:pPr defTabSz="897301" fontAlgn="base">
-              <a:lnSpc>
-                <a:spcPct val="100000"/>
-              </a:lnSpc>
-              <a:spcBef>
-                <a:spcPct val="30000"/>
-              </a:spcBef>
-              <a:spcAft>
-                <a:spcPct val="0"/>
-              </a:spcAft>
-              <a:defRPr/>
-            </a:pPr>
-            <a:endParaRPr lang="en-US" dirty="0" smtClean="0"/>
+            <a:pPr rtl="0"/>
+            <a:r>
+              <a:rPr lang="en-US" b="1" dirty="0" smtClean="0">
+                <a:effectLst/>
+                <a:latin typeface="Segoe UI" panose="020B0502040204020203" pitchFamily="34" charset="0"/>
+              </a:rPr>
+              <a:t>Slide Objectives:</a:t>
+            </a:r>
+            <a:endParaRPr lang="en-US" dirty="0" smtClean="0">
+              <a:effectLst/>
+            </a:endParaRPr>
+          </a:p>
+          <a:p>
+            <a:pPr rtl="0"/>
+            <a:r>
+              <a:rPr lang="en-US" dirty="0" smtClean="0">
+                <a:effectLst/>
+                <a:latin typeface="Segoe UI" panose="020B0502040204020203" pitchFamily="34" charset="0"/>
+              </a:rPr>
+              <a:t>Highlight</a:t>
+            </a:r>
+            <a:r>
+              <a:rPr lang="en-US" baseline="0" dirty="0" smtClean="0">
+                <a:effectLst/>
+                <a:latin typeface="Segoe UI" panose="020B0502040204020203" pitchFamily="34" charset="0"/>
+              </a:rPr>
+              <a:t> the SOAP API available to provide custom reporting solutions</a:t>
+            </a:r>
+            <a:endParaRPr lang="en-US" dirty="0" smtClean="0">
+              <a:effectLst/>
+            </a:endParaRPr>
+          </a:p>
+          <a:p>
+            <a:pPr rtl="0"/>
+            <a:r>
+              <a:rPr lang="en-US" b="1" dirty="0" smtClean="0">
+                <a:effectLst/>
+                <a:latin typeface="Segoe UI" panose="020B0502040204020203" pitchFamily="34" charset="0"/>
+              </a:rPr>
+              <a:t>Transition:</a:t>
+            </a:r>
+            <a:endParaRPr lang="en-US" dirty="0" smtClean="0">
+              <a:effectLst/>
+            </a:endParaRPr>
+          </a:p>
+          <a:p>
+            <a:pPr rtl="0"/>
+            <a:r>
+              <a:rPr lang="en-US" dirty="0" smtClean="0"/>
+              <a:t>Interact with the report server Web service by using the SOAP API. This API provides several Web service endpoints for report</a:t>
+            </a:r>
+            <a:r>
+              <a:rPr lang="en-US" baseline="0" dirty="0" smtClean="0"/>
+              <a:t> management and execution.</a:t>
+            </a:r>
+            <a:endParaRPr lang="en-US" dirty="0" smtClean="0">
+              <a:effectLst/>
+            </a:endParaRPr>
+          </a:p>
+          <a:p>
+            <a:pPr rtl="0"/>
+            <a:r>
+              <a:rPr lang="en-US" b="1" dirty="0" smtClean="0">
+                <a:effectLst/>
+                <a:latin typeface="Segoe UI" panose="020B0502040204020203" pitchFamily="34" charset="0"/>
+              </a:rPr>
+              <a:t>Speaking Points:</a:t>
+            </a:r>
+            <a:endParaRPr lang="en-US" dirty="0" smtClean="0">
+              <a:effectLst/>
+            </a:endParaRPr>
+          </a:p>
+          <a:p>
+            <a:pPr rtl="0"/>
+            <a:r>
+              <a:rPr lang="en-US" dirty="0" smtClean="0">
+                <a:effectLst/>
+                <a:latin typeface="Segoe UI" panose="020B0502040204020203" pitchFamily="34" charset="0"/>
+              </a:rPr>
+              <a:t>The Web</a:t>
+            </a:r>
+            <a:r>
+              <a:rPr lang="en-US" baseline="0" dirty="0" smtClean="0">
+                <a:effectLst/>
+                <a:latin typeface="Segoe UI" panose="020B0502040204020203" pitchFamily="34" charset="0"/>
+              </a:rPr>
+              <a:t> service endpoints currently support report management and execution to enable development of custom reporting solutions. </a:t>
+            </a:r>
+            <a:endParaRPr lang="en-US" dirty="0" smtClean="0">
+              <a:effectLst/>
+            </a:endParaRPr>
+          </a:p>
+          <a:p>
+            <a:pPr rtl="0"/>
+            <a:r>
+              <a:rPr lang="en-US" dirty="0" smtClean="0">
+                <a:effectLst/>
+                <a:latin typeface="Segoe UI" panose="020B0502040204020203" pitchFamily="34" charset="0"/>
+              </a:rPr>
+              <a:t>The API</a:t>
+            </a:r>
+            <a:r>
+              <a:rPr lang="en-US" baseline="0" dirty="0" smtClean="0">
+                <a:effectLst/>
+                <a:latin typeface="Segoe UI" panose="020B0502040204020203" pitchFamily="34" charset="0"/>
+              </a:rPr>
+              <a:t> allows for report deployment and export of data, as well as reporting configuration and report execution.</a:t>
+            </a:r>
+            <a:endParaRPr lang="en-US" dirty="0" smtClean="0">
+              <a:effectLst/>
+            </a:endParaRPr>
+          </a:p>
+          <a:p>
+            <a:pPr rtl="0"/>
+            <a:r>
+              <a:rPr lang="en-US" b="1" dirty="0" smtClean="0">
+                <a:effectLst/>
+                <a:latin typeface="Segoe UI" panose="020B0502040204020203" pitchFamily="34" charset="0"/>
+              </a:rPr>
+              <a:t>Notes:</a:t>
+            </a:r>
+            <a:endParaRPr lang="en-US" dirty="0" smtClean="0">
+              <a:effectLst/>
+            </a:endParaRPr>
+          </a:p>
+          <a:p>
+            <a:pPr rtl="0"/>
+            <a:r>
+              <a:rPr lang="en-US" dirty="0" smtClean="0">
+                <a:effectLst/>
+                <a:latin typeface="Segoe UI" panose="020B0502040204020203" pitchFamily="34" charset="0"/>
+              </a:rPr>
+              <a:t>Any notes go here</a:t>
+            </a:r>
+            <a:endParaRPr lang="en-US" dirty="0" smtClean="0">
+              <a:effectLst/>
+            </a:endParaRPr>
+          </a:p>
+          <a:p>
+            <a:endParaRPr lang="en-US" dirty="0"/>
           </a:p>
         </p:txBody>
       </p:sp>
@@ -4721,6 +6583,137 @@
         <p:txBody>
           <a:bodyPr/>
           <a:lstStyle/>
+          <a:p>
+            <a:pPr rtl="0"/>
+            <a:r>
+              <a:rPr lang="en-US" b="1" dirty="0" smtClean="0">
+                <a:effectLst/>
+                <a:latin typeface="Segoe UI" panose="020B0502040204020203" pitchFamily="34" charset="0"/>
+              </a:rPr>
+              <a:t>Slide Objectives:</a:t>
+            </a:r>
+            <a:endParaRPr lang="en-US" dirty="0" smtClean="0">
+              <a:effectLst/>
+            </a:endParaRPr>
+          </a:p>
+          <a:p>
+            <a:pPr rtl="0"/>
+            <a:r>
+              <a:rPr lang="en-US" dirty="0" smtClean="0">
+                <a:effectLst/>
+                <a:latin typeface="Segoe UI" panose="020B0502040204020203" pitchFamily="34" charset="0"/>
+              </a:rPr>
+              <a:t>An example of using the SOAP API to render a report</a:t>
+            </a:r>
+            <a:endParaRPr lang="en-US" dirty="0" smtClean="0">
+              <a:effectLst/>
+            </a:endParaRPr>
+          </a:p>
+          <a:p>
+            <a:pPr rtl="0"/>
+            <a:r>
+              <a:rPr lang="en-US" b="1" dirty="0" smtClean="0">
+                <a:effectLst/>
+                <a:latin typeface="Segoe UI" panose="020B0502040204020203" pitchFamily="34" charset="0"/>
+              </a:rPr>
+              <a:t>Transition:</a:t>
+            </a:r>
+            <a:endParaRPr lang="en-US" dirty="0" smtClean="0">
+              <a:effectLst/>
+            </a:endParaRPr>
+          </a:p>
+          <a:p>
+            <a:pPr rtl="0"/>
+            <a:r>
+              <a:rPr lang="en-US" dirty="0" smtClean="0">
+                <a:effectLst/>
+                <a:latin typeface="Segoe UI" panose="020B0502040204020203" pitchFamily="34" charset="0"/>
+              </a:rPr>
+              <a:t>This slide illustrates how</a:t>
+            </a:r>
+            <a:r>
+              <a:rPr lang="en-US" baseline="0" dirty="0" smtClean="0">
+                <a:effectLst/>
+                <a:latin typeface="Segoe UI" panose="020B0502040204020203" pitchFamily="34" charset="0"/>
+              </a:rPr>
+              <a:t> to use the SOAP API to render a report.</a:t>
+            </a:r>
+            <a:endParaRPr lang="en-US" dirty="0" smtClean="0">
+              <a:effectLst/>
+            </a:endParaRPr>
+          </a:p>
+          <a:p>
+            <a:pPr rtl="0"/>
+            <a:r>
+              <a:rPr lang="en-US" b="1" dirty="0" smtClean="0">
+                <a:effectLst/>
+                <a:latin typeface="Segoe UI" panose="020B0502040204020203" pitchFamily="34" charset="0"/>
+              </a:rPr>
+              <a:t>Speaking Points:</a:t>
+            </a:r>
+            <a:endParaRPr lang="en-US" dirty="0" smtClean="0">
+              <a:effectLst/>
+            </a:endParaRPr>
+          </a:p>
+          <a:p>
+            <a:pPr rtl="0"/>
+            <a:r>
+              <a:rPr lang="en-US" dirty="0" smtClean="0">
+                <a:effectLst/>
+                <a:latin typeface="Segoe UI" panose="020B0502040204020203" pitchFamily="34" charset="0"/>
+              </a:rPr>
+              <a:t>In this example,</a:t>
+            </a:r>
+            <a:r>
+              <a:rPr lang="en-US" baseline="0" dirty="0" smtClean="0">
+                <a:effectLst/>
+                <a:latin typeface="Segoe UI" panose="020B0502040204020203" pitchFamily="34" charset="0"/>
+              </a:rPr>
+              <a:t> the Render method is called to process a specific report and render the report in a specified format. </a:t>
+            </a:r>
+          </a:p>
+          <a:p>
+            <a:pPr rtl="0"/>
+            <a:r>
+              <a:rPr lang="en-US" baseline="0" dirty="0" smtClean="0">
+                <a:effectLst/>
+                <a:latin typeface="Segoe UI" panose="020B0502040204020203" pitchFamily="34" charset="0"/>
+              </a:rPr>
+              <a:t>Report formats include XML, HTML4.0, Excel, Word, HTML3.2, CSV, PDF, and IMAGE.</a:t>
+            </a:r>
+            <a:endParaRPr lang="en-US" dirty="0" smtClean="0">
+              <a:effectLst/>
+            </a:endParaRPr>
+          </a:p>
+          <a:p>
+            <a:pPr rtl="0"/>
+            <a:r>
+              <a:rPr lang="en-US" b="1" dirty="0" smtClean="0">
+                <a:effectLst/>
+                <a:latin typeface="Segoe UI" panose="020B0502040204020203" pitchFamily="34" charset="0"/>
+              </a:rPr>
+              <a:t>Notes:</a:t>
+            </a:r>
+            <a:endParaRPr lang="en-US" dirty="0" smtClean="0">
+              <a:effectLst/>
+            </a:endParaRPr>
+          </a:p>
+          <a:p>
+            <a:pPr rtl="0"/>
+            <a:r>
+              <a:rPr lang="en-US" dirty="0" smtClean="0">
+                <a:effectLst/>
+                <a:latin typeface="Segoe UI" panose="020B0502040204020203" pitchFamily="34" charset="0"/>
+              </a:rPr>
+              <a:t>Any notes go here</a:t>
+            </a:r>
+            <a:endParaRPr lang="en-US" dirty="0" smtClean="0">
+              <a:effectLst/>
+            </a:endParaRPr>
+          </a:p>
+          <a:p>
+            <a:endParaRPr lang="en-US" dirty="0" smtClean="0"/>
+          </a:p>
           <a:p>
             <a:endParaRPr lang="en-US" dirty="0"/>
           </a:p>
@@ -24162,7 +26155,17 @@
                   </a:schemeClr>
                 </a:solidFill>
               </a:rPr>
-              <a:t>SQL Server Reporting as a Service</a:t>
+              <a:t>SQL </a:t>
+            </a:r>
+            <a:r>
+              <a:rPr lang="en-US" sz="2800" dirty="0" smtClean="0">
+                <a:solidFill>
+                  <a:schemeClr val="accent2">
+                    <a:alpha val="99000"/>
+                  </a:schemeClr>
+                </a:solidFill>
+              </a:rPr>
+              <a:t>Reporting Security Model</a:t>
             </a:r>
             <a:endParaRPr lang="en-US" sz="2800" dirty="0" smtClean="0"/>
           </a:p>
@@ -29279,7 +31282,7 @@
         <p:spPr>
           <a:xfrm>
             <a:off x="519112" y="1447799"/>
-            <a:ext cx="11149013" cy="4425827"/>
+            <a:ext cx="11149013" cy="5072158"/>
           </a:xfrm>
         </p:spPr>
         <p:txBody>
@@ -29356,8 +31359,17 @@
               <a:rPr lang="en-US" dirty="0" smtClean="0">
                 <a:sym typeface="Wingdings" pitchFamily="2" charset="2"/>
               </a:rPr>
-              <a:t>SQL Reporting scales automatically: additional instances of 200 reports will cost $0.88/hour</a:t>
-            </a:r>
+              <a:t>SQL Reporting scales automatically: </a:t>
+            </a:r>
+            <a:r>
+              <a:rPr lang="en-US" dirty="0" smtClean="0">
+                <a:sym typeface="Wingdings" pitchFamily="2" charset="2"/>
+              </a:rPr>
+              <a:t>each clock hour in which more than 200 reports are generated is billed another Reporting Instance hour ($0.88)</a:t>
+            </a:r>
+            <a:endParaRPr lang="en-US" dirty="0" smtClean="0">
+              <a:sym typeface="Wingdings" pitchFamily="2" charset="2"/>
+            </a:endParaRPr>
           </a:p>
           <a:p>
             <a:pPr lvl="2"/>
@@ -30475,8 +32487,8 @@
         </p:nvSpPr>
         <p:spPr>
           <a:xfrm>
-            <a:off x="8075612" y="3401493"/>
-            <a:ext cx="3147188" cy="332399"/>
+            <a:off x="8075611" y="3401493"/>
+            <a:ext cx="3687763" cy="332399"/>
           </a:xfrm>
           <a:prstGeom prst="rect">
             <a:avLst/>
@@ -30700,7 +32712,15 @@
             </a:pPr>
             <a:r>
               <a:rPr lang="en-US" sz="2400" dirty="0" smtClean="0"/>
-              <a:t>SQL Azure connectivity</a:t>
+              <a:t>SQL </a:t>
+            </a:r>
+            <a:r>
+              <a:rPr lang="en-US" sz="2400" dirty="0" smtClean="0"/>
+              <a:t>Database </a:t>
+            </a:r>
+            <a:r>
+              <a:rPr lang="en-US" sz="2400" dirty="0" smtClean="0"/>
+              <a:t>connectivity</a:t>
             </a:r>
             <a:endParaRPr lang="en-US" sz="2400" dirty="0"/>
           </a:p>
@@ -33666,7 +35686,13 @@
               <a:rPr lang="en-US" sz="2000" dirty="0" smtClean="0">
                 <a:latin typeface="+mn-lt"/>
               </a:rPr>
-              <a:t>Global Distribution</a:t>
+              <a:t>Global </a:t>
+            </a:r>
+            <a:r>
+              <a:rPr lang="en-US" sz="2000" dirty="0" smtClean="0">
+                <a:latin typeface="+mn-lt"/>
+              </a:rPr>
+              <a:t>Distribution</a:t>
             </a:r>
           </a:p>
         </p:txBody>
@@ -40072,6 +42098,15 @@
 </file>
 
 <file path=customXml/item1.xml><?xml version="1.0" encoding="utf-8"?>
+<?mso-contentType ?>
+<FormTemplates xmlns="http://schemas.microsoft.com/sharepoint/v3/contenttype/forms">
+  <Display>DocumentLibraryForm</Display>
+  <Edit>DocumentLibraryForm</Edit>
+  <New>DocumentLibraryForm</New>
+</FormTemplates>
+</file>
+
+<file path=customXml/item2.xml><?xml version="1.0" encoding="utf-8"?>
 <ct:contentTypeSchema xmlns:ct="http://schemas.microsoft.com/office/2006/metadata/contentType" xmlns:ma="http://schemas.microsoft.com/office/2006/metadata/properties/metaAttributes" ct:_="" ma:_="" ma:contentTypeName="Document" ma:contentTypeID="0x0101006A306AC29967F74B89DE3244B3C831EA" ma:contentTypeVersion="0" ma:contentTypeDescription="Create a new document." ma:contentTypeScope="" ma:versionID="a40da4b0cc3a1fca7b774ac2c8306326">
   <xsd:schema xmlns:xsd="http://www.w3.org/2001/XMLSchema" xmlns:xs="http://www.w3.org/2001/XMLSchema" xmlns:p="http://schemas.microsoft.com/office/2006/metadata/properties" xmlns:ns2="230e9df3-be65-4c73-a93b-d1236ebd677e" targetNamespace="http://schemas.microsoft.com/office/2006/metadata/properties" ma:root="true" ma:fieldsID="e317b0b832c9845d3aae3abd1bb0954e" ns2:_="">
     <xsd:import namespace="230e9df3-be65-4c73-a93b-d1236ebd677e"/>
@@ -40223,7 +42258,7 @@
 </ct:contentTypeSchema>
 </file>
 
-<file path=customXml/item2.xml><?xml version="1.0" encoding="utf-8"?>
+<file path=customXml/item3.xml><?xml version="1.0" encoding="utf-8"?>
 <p:properties xmlns:p="http://schemas.microsoft.com/office/2006/metadata/properties" xmlns:xsi="http://www.w3.org/2001/XMLSchema-instance" xmlns:pc="http://schemas.microsoft.com/office/infopath/2007/PartnerControls">
   <documentManagement>
     <TaxKeywordTaxHTField xmlns="230e9df3-be65-4c73-a93b-d1236ebd677e">
@@ -40234,16 +42269,15 @@
 </p:properties>
 </file>
 
-<file path=customXml/item3.xml><?xml version="1.0" encoding="utf-8"?>
-<?mso-contentType ?>
-<FormTemplates xmlns="http://schemas.microsoft.com/sharepoint/v3/contenttype/forms">
-  <Display>DocumentLibraryForm</Display>
-  <Edit>DocumentLibraryForm</Edit>
-  <New>DocumentLibraryForm</New>
-</FormTemplates>
+<file path=customXml/itemProps1.xml><?xml version="1.0" encoding="utf-8"?>
+<ds:datastoreItem xmlns:ds="http://schemas.openxmlformats.org/officeDocument/2006/customXml" ds:itemID="{18D05BB3-AE21-4656-B1B7-55B5FA9A8584}">
+  <ds:schemaRefs>
+    <ds:schemaRef ds:uri="http://schemas.microsoft.com/sharepoint/v3/contenttype/forms"/>
+  </ds:schemaRefs>
+</ds:datastoreItem>
 </file>
 
-<file path=customXml/itemProps1.xml><?xml version="1.0" encoding="utf-8"?>
+<file path=customXml/itemProps2.xml><?xml version="1.0" encoding="utf-8"?>
 <ds:datastoreItem xmlns:ds="http://schemas.openxmlformats.org/officeDocument/2006/customXml" ds:itemID="{745C7B07-8A5F-480D-BF8F-2AB99A43D71E}">
   <ds:schemaRefs>
     <ds:schemaRef ds:uri="http://schemas.microsoft.com/office/2006/metadata/contentType"/>
@@ -40261,26 +42295,18 @@
 </ds:datastoreItem>
 </file>
 
-<file path=customXml/itemProps2.xml><?xml version="1.0" encoding="utf-8"?>
+<file path=customXml/itemProps3.xml><?xml version="1.0" encoding="utf-8"?>
 <ds:datastoreItem xmlns:ds="http://schemas.openxmlformats.org/officeDocument/2006/customXml" ds:itemID="{D9CCBF04-6D72-4BC2-9FC6-6F273FBBE3E1}">
   <ds:schemaRefs>
     <ds:schemaRef ds:uri="http://purl.org/dc/elements/1.1/"/>
+    <ds:schemaRef ds:uri="http://schemas.microsoft.com/office/2006/metadata/properties"/>
+    <ds:schemaRef ds:uri="http://purl.org/dc/terms/"/>
+    <ds:schemaRef ds:uri="230e9df3-be65-4c73-a93b-d1236ebd677e"/>
+    <ds:schemaRef ds:uri="http://schemas.microsoft.com/office/2006/documentManagement/types"/>
+    <ds:schemaRef ds:uri="http://schemas.openxmlformats.org/package/2006/metadata/core-properties"/>
+    <ds:schemaRef ds:uri="http://purl.org/dc/dcmitype/"/>
+    <ds:schemaRef ds:uri="http://schemas.microsoft.com/office/infopath/2007/PartnerControls"/>
     <ds:schemaRef ds:uri="http://www.w3.org/XML/1998/namespace"/>
-    <ds:schemaRef ds:uri="http://schemas.openxmlformats.org/package/2006/metadata/core-properties"/>
-    <ds:schemaRef ds:uri="http://schemas.microsoft.com/office/2006/documentManagement/types"/>
-    <ds:schemaRef ds:uri="http://schemas.microsoft.com/office/2006/metadata/properties"/>
-    <ds:schemaRef ds:uri="http://purl.org/dc/dcmitype/"/>
-    <ds:schemaRef ds:uri="http://purl.org/dc/terms/"/>
-    <ds:schemaRef ds:uri="http://schemas.microsoft.com/office/infopath/2007/PartnerControls"/>
-    <ds:schemaRef ds:uri="230e9df3-be65-4c73-a93b-d1236ebd677e"/>
-  </ds:schemaRefs>
-</ds:datastoreItem>
-</file>
-
-<file path=customXml/itemProps3.xml><?xml version="1.0" encoding="utf-8"?>
-<ds:datastoreItem xmlns:ds="http://schemas.openxmlformats.org/officeDocument/2006/customXml" ds:itemID="{18D05BB3-AE21-4656-B1B7-55B5FA9A8584}">
-  <ds:schemaRefs>
-    <ds:schemaRef ds:uri="http://schemas.microsoft.com/sharepoint/v3/contenttype/forms"/>
   </ds:schemaRefs>
 </ds:datastoreItem>
 </file>
</xml_diff>